<commit_message>
Revised capstone files March 27 2025
</commit_message>
<xml_diff>
--- a/Final_Capstone_Slides_PreetiDubey.pptx
+++ b/Final_Capstone_Slides_PreetiDubey.pptx
@@ -6,17 +6,18 @@
   </p:sldMasterIdLst>
   <p:sldIdLst>
     <p:sldId id="256" r:id="rId2"/>
-    <p:sldId id="257" r:id="rId3"/>
+    <p:sldId id="269" r:id="rId3"/>
     <p:sldId id="261" r:id="rId4"/>
     <p:sldId id="259" r:id="rId5"/>
     <p:sldId id="260" r:id="rId6"/>
-    <p:sldId id="262" r:id="rId7"/>
-    <p:sldId id="264" r:id="rId8"/>
-    <p:sldId id="263" r:id="rId9"/>
-    <p:sldId id="265" r:id="rId10"/>
-    <p:sldId id="266" r:id="rId11"/>
+    <p:sldId id="264" r:id="rId7"/>
+    <p:sldId id="263" r:id="rId8"/>
+    <p:sldId id="265" r:id="rId9"/>
+    <p:sldId id="266" r:id="rId10"/>
+    <p:sldId id="271" r:id="rId11"/>
     <p:sldId id="267" r:id="rId12"/>
     <p:sldId id="268" r:id="rId13"/>
+    <p:sldId id="270" r:id="rId14"/>
   </p:sldIdLst>
   <p:sldSz cx="12192000" cy="6858000"/>
   <p:notesSz cx="6858000" cy="9144000"/>
@@ -270,7 +271,7 @@
           <a:p>
             <a:fld id="{36CCF6DB-A21D-C94F-8225-03EDDF8277ED}" type="datetimeFigureOut">
               <a:rPr lang="en-US" smtClean="0"/>
-              <a:t>3/18/25</a:t>
+              <a:t>3/27/25</a:t>
             </a:fld>
             <a:endParaRPr lang="en-US"/>
           </a:p>
@@ -468,7 +469,7 @@
           <a:p>
             <a:fld id="{36CCF6DB-A21D-C94F-8225-03EDDF8277ED}" type="datetimeFigureOut">
               <a:rPr lang="en-US" smtClean="0"/>
-              <a:t>3/18/25</a:t>
+              <a:t>3/27/25</a:t>
             </a:fld>
             <a:endParaRPr lang="en-US"/>
           </a:p>
@@ -676,7 +677,7 @@
           <a:p>
             <a:fld id="{36CCF6DB-A21D-C94F-8225-03EDDF8277ED}" type="datetimeFigureOut">
               <a:rPr lang="en-US" smtClean="0"/>
-              <a:t>3/18/25</a:t>
+              <a:t>3/27/25</a:t>
             </a:fld>
             <a:endParaRPr lang="en-US"/>
           </a:p>
@@ -874,7 +875,7 @@
           <a:p>
             <a:fld id="{36CCF6DB-A21D-C94F-8225-03EDDF8277ED}" type="datetimeFigureOut">
               <a:rPr lang="en-US" smtClean="0"/>
-              <a:t>3/18/25</a:t>
+              <a:t>3/27/25</a:t>
             </a:fld>
             <a:endParaRPr lang="en-US"/>
           </a:p>
@@ -1149,7 +1150,7 @@
           <a:p>
             <a:fld id="{36CCF6DB-A21D-C94F-8225-03EDDF8277ED}" type="datetimeFigureOut">
               <a:rPr lang="en-US" smtClean="0"/>
-              <a:t>3/18/25</a:t>
+              <a:t>3/27/25</a:t>
             </a:fld>
             <a:endParaRPr lang="en-US"/>
           </a:p>
@@ -1414,7 +1415,7 @@
           <a:p>
             <a:fld id="{36CCF6DB-A21D-C94F-8225-03EDDF8277ED}" type="datetimeFigureOut">
               <a:rPr lang="en-US" smtClean="0"/>
-              <a:t>3/18/25</a:t>
+              <a:t>3/27/25</a:t>
             </a:fld>
             <a:endParaRPr lang="en-US"/>
           </a:p>
@@ -1826,7 +1827,7 @@
           <a:p>
             <a:fld id="{36CCF6DB-A21D-C94F-8225-03EDDF8277ED}" type="datetimeFigureOut">
               <a:rPr lang="en-US" smtClean="0"/>
-              <a:t>3/18/25</a:t>
+              <a:t>3/27/25</a:t>
             </a:fld>
             <a:endParaRPr lang="en-US"/>
           </a:p>
@@ -1967,7 +1968,7 @@
           <a:p>
             <a:fld id="{36CCF6DB-A21D-C94F-8225-03EDDF8277ED}" type="datetimeFigureOut">
               <a:rPr lang="en-US" smtClean="0"/>
-              <a:t>3/18/25</a:t>
+              <a:t>3/27/25</a:t>
             </a:fld>
             <a:endParaRPr lang="en-US"/>
           </a:p>
@@ -2080,7 +2081,7 @@
           <a:p>
             <a:fld id="{36CCF6DB-A21D-C94F-8225-03EDDF8277ED}" type="datetimeFigureOut">
               <a:rPr lang="en-US" smtClean="0"/>
-              <a:t>3/18/25</a:t>
+              <a:t>3/27/25</a:t>
             </a:fld>
             <a:endParaRPr lang="en-US"/>
           </a:p>
@@ -2391,7 +2392,7 @@
           <a:p>
             <a:fld id="{36CCF6DB-A21D-C94F-8225-03EDDF8277ED}" type="datetimeFigureOut">
               <a:rPr lang="en-US" smtClean="0"/>
-              <a:t>3/18/25</a:t>
+              <a:t>3/27/25</a:t>
             </a:fld>
             <a:endParaRPr lang="en-US"/>
           </a:p>
@@ -2679,7 +2680,7 @@
           <a:p>
             <a:fld id="{36CCF6DB-A21D-C94F-8225-03EDDF8277ED}" type="datetimeFigureOut">
               <a:rPr lang="en-US" smtClean="0"/>
-              <a:t>3/18/25</a:t>
+              <a:t>3/27/25</a:t>
             </a:fld>
             <a:endParaRPr lang="en-US"/>
           </a:p>
@@ -2920,7 +2921,7 @@
           <a:p>
             <a:fld id="{36CCF6DB-A21D-C94F-8225-03EDDF8277ED}" type="datetimeFigureOut">
               <a:rPr lang="en-US" smtClean="0"/>
-              <a:t>3/18/25</a:t>
+              <a:t>3/27/25</a:t>
             </a:fld>
             <a:endParaRPr lang="en-US"/>
           </a:p>
@@ -3524,7 +3525,7 @@
         <p:cNvPr id="1" name="">
           <a:extLst>
             <a:ext uri="{FF2B5EF4-FFF2-40B4-BE49-F238E27FC236}">
-              <a16:creationId xmlns:a16="http://schemas.microsoft.com/office/drawing/2014/main" id="{F2159439-AE75-F047-3084-A7EAB41E3DD1}"/>
+              <a16:creationId xmlns:a16="http://schemas.microsoft.com/office/drawing/2014/main" id="{2A4E8134-DBC7-E6D7-D26D-ABA6333FD77E}"/>
             </a:ext>
           </a:extLst>
         </p:cNvPr>
@@ -3541,10 +3542,10 @@
       </p:grpSpPr>
       <p:pic>
         <p:nvPicPr>
-          <p:cNvPr id="3074" name="Picture 2">
-            <a:extLst>
-              <a:ext uri="{FF2B5EF4-FFF2-40B4-BE49-F238E27FC236}">
-                <a16:creationId xmlns:a16="http://schemas.microsoft.com/office/drawing/2014/main" id="{7C2097D6-7940-1399-BB88-475AD60B4940}"/>
+          <p:cNvPr id="1026" name="Picture 2">
+            <a:extLst>
+              <a:ext uri="{FF2B5EF4-FFF2-40B4-BE49-F238E27FC236}">
+                <a16:creationId xmlns:a16="http://schemas.microsoft.com/office/drawing/2014/main" id="{B6E6AC92-ECF4-9D81-4305-5FDF082ACD41}"/>
               </a:ext>
             </a:extLst>
           </p:cNvPr>
@@ -3568,8 +3569,8 @@
         </p:blipFill>
         <p:spPr bwMode="auto">
           <a:xfrm>
-            <a:off x="104931" y="0"/>
-            <a:ext cx="11721944" cy="6858000"/>
+            <a:off x="0" y="0"/>
+            <a:ext cx="12192000" cy="6858000"/>
           </a:xfrm>
           <a:prstGeom prst="rect">
             <a:avLst/>
@@ -3589,7 +3590,7 @@
     </p:spTree>
     <p:extLst>
       <p:ext uri="{BB962C8B-B14F-4D97-AF65-F5344CB8AC3E}">
-        <p14:creationId xmlns:p14="http://schemas.microsoft.com/office/powerpoint/2010/main" val="554870010"/>
+        <p14:creationId xmlns:p14="http://schemas.microsoft.com/office/powerpoint/2010/main" val="3261722809"/>
       </p:ext>
     </p:extLst>
   </p:cSld>
@@ -3602,6 +3603,14 @@
 <file path=ppt/slides/slide11.xml><?xml version="1.0" encoding="utf-8"?>
 <p:sld xmlns:a="http://schemas.openxmlformats.org/drawingml/2006/main" xmlns:r="http://schemas.openxmlformats.org/officeDocument/2006/relationships" xmlns:p="http://schemas.openxmlformats.org/presentationml/2006/main">
   <p:cSld>
+    <p:bg>
+      <p:bgPr>
+        <a:solidFill>
+          <a:schemeClr val="bg1"/>
+        </a:solidFill>
+        <a:effectLst/>
+      </p:bgPr>
+    </p:bg>
     <p:spTree>
       <p:nvGrpSpPr>
         <p:cNvPr id="1" name=""/>
@@ -3618,6 +3627,72 @@
       </p:grpSpPr>
       <p:sp>
         <p:nvSpPr>
+          <p:cNvPr id="3081" name="Down Arrow 7">
+            <a:extLst>
+              <a:ext uri="{FF2B5EF4-FFF2-40B4-BE49-F238E27FC236}">
+                <a16:creationId xmlns:a16="http://schemas.microsoft.com/office/drawing/2014/main" id="{D4771268-CB57-404A-9271-370EB28F6090}"/>
+              </a:ext>
+              <a:ext uri="{C183D7F6-B498-43B3-948B-1728B52AA6E4}">
+                <adec:decorative xmlns:adec="http://schemas.microsoft.com/office/drawing/2017/decorative" val="1"/>
+              </a:ext>
+            </a:extLst>
+          </p:cNvPr>
+          <p:cNvSpPr>
+            <a:spLocks noGrp="1" noRot="1" noChangeAspect="1" noMove="1" noResize="1" noEditPoints="1" noAdjustHandles="1" noChangeArrowheads="1" noChangeShapeType="1" noTextEdit="1"/>
+          </p:cNvSpPr>
+          <p:nvPr>
+            <p:extLst>
+              <p:ext uri="{386F3935-93C4-4BCD-93E2-E3B085C9AB24}">
+                <p16:designElem xmlns:p16="http://schemas.microsoft.com/office/powerpoint/2015/main" val="1"/>
+              </p:ext>
+            </p:extLst>
+          </p:nvPr>
+        </p:nvSpPr>
+        <p:spPr>
+          <a:xfrm rot="16200000">
+            <a:off x="800100" y="1491343"/>
+            <a:ext cx="3333749" cy="3499103"/>
+          </a:xfrm>
+          <a:prstGeom prst="downArrow">
+            <a:avLst>
+              <a:gd name="adj1" fmla="val 100000"/>
+              <a:gd name="adj2" fmla="val 15788"/>
+            </a:avLst>
+          </a:prstGeom>
+          <a:solidFill>
+            <a:srgbClr val="404040"/>
+          </a:solidFill>
+          <a:ln w="53975">
+            <a:noFill/>
+          </a:ln>
+        </p:spPr>
+        <p:style>
+          <a:lnRef idx="2">
+            <a:schemeClr val="accent1">
+              <a:shade val="50000"/>
+            </a:schemeClr>
+          </a:lnRef>
+          <a:fillRef idx="1">
+            <a:schemeClr val="accent1"/>
+          </a:fillRef>
+          <a:effectRef idx="0">
+            <a:schemeClr val="accent1"/>
+          </a:effectRef>
+          <a:fontRef idx="minor">
+            <a:schemeClr val="lt1"/>
+          </a:fontRef>
+        </p:style>
+        <p:txBody>
+          <a:bodyPr rtlCol="0" anchor="ctr"/>
+          <a:lstStyle/>
+          <a:p>
+            <a:pPr algn="ctr"/>
+            <a:endParaRPr lang="en-US"/>
+          </a:p>
+        </p:txBody>
+      </p:sp>
+      <p:sp>
+        <p:nvSpPr>
           <p:cNvPr id="2" name="Title 1">
             <a:extLst>
               <a:ext uri="{FF2B5EF4-FFF2-40B4-BE49-F238E27FC236}">
@@ -3634,1309 +3709,100 @@
         </p:nvSpPr>
         <p:spPr>
           <a:xfrm>
-            <a:off x="-1" y="35341"/>
-            <a:ext cx="11782269" cy="879059"/>
+            <a:off x="838200" y="1967266"/>
+            <a:ext cx="2908300" cy="2547257"/>
           </a:xfrm>
+          <a:noFill/>
         </p:spPr>
         <p:txBody>
-          <a:bodyPr>
+          <a:bodyPr vert="horz" lIns="91440" tIns="45720" rIns="91440" bIns="45720" rtlCol="0" anchor="ctr">
             <a:normAutofit/>
           </a:bodyPr>
           <a:lstStyle/>
           <a:p>
-            <a:r>
-              <a:rPr lang="en-US" sz="3200" b="1" dirty="0"/>
-              <a:t>Model Performance Comparison Chart: LSTM is the best model</a:t>
-            </a:r>
-          </a:p>
-        </p:txBody>
-      </p:sp>
-      <p:graphicFrame>
-        <p:nvGraphicFramePr>
-          <p:cNvPr id="6" name="Table 5">
-            <a:extLst>
-              <a:ext uri="{FF2B5EF4-FFF2-40B4-BE49-F238E27FC236}">
-                <a16:creationId xmlns:a16="http://schemas.microsoft.com/office/drawing/2014/main" id="{019654E3-ABFE-26A8-8F46-728EAF2EEC47}"/>
-              </a:ext>
-            </a:extLst>
-          </p:cNvPr>
-          <p:cNvGraphicFramePr>
-            <a:graphicFrameLocks noGrp="1"/>
-          </p:cNvGraphicFramePr>
-          <p:nvPr>
-            <p:extLst>
-              <p:ext uri="{D42A27DB-BD31-4B8C-83A1-F6EECF244321}">
-                <p14:modId xmlns:p14="http://schemas.microsoft.com/office/powerpoint/2010/main" val="3596063638"/>
-              </p:ext>
-            </p:extLst>
-          </p:nvPr>
-        </p:nvGraphicFramePr>
-        <p:xfrm>
-          <a:off x="524656" y="1606081"/>
-          <a:ext cx="11057743" cy="4886794"/>
-        </p:xfrm>
-        <a:graphic>
-          <a:graphicData uri="http://schemas.openxmlformats.org/drawingml/2006/table">
-            <a:tbl>
-              <a:tblPr firstRow="1" firstCol="1" bandRow="1">
-                <a:tableStyleId>{5C22544A-7EE6-4342-B048-85BDC9FD1C3A}</a:tableStyleId>
-              </a:tblPr>
-              <a:tblGrid>
-                <a:gridCol w="2189515">
-                  <a:extLst>
-                    <a:ext uri="{9D8B030D-6E8A-4147-A177-3AD203B41FA5}">
-                      <a16:colId xmlns:a16="http://schemas.microsoft.com/office/drawing/2014/main" val="46828593"/>
-                    </a:ext>
-                  </a:extLst>
-                </a:gridCol>
-                <a:gridCol w="1662003">
-                  <a:extLst>
-                    <a:ext uri="{9D8B030D-6E8A-4147-A177-3AD203B41FA5}">
-                      <a16:colId xmlns:a16="http://schemas.microsoft.com/office/drawing/2014/main" val="868583746"/>
-                    </a:ext>
-                  </a:extLst>
-                </a:gridCol>
-                <a:gridCol w="1669281">
-                  <a:extLst>
-                    <a:ext uri="{9D8B030D-6E8A-4147-A177-3AD203B41FA5}">
-                      <a16:colId xmlns:a16="http://schemas.microsoft.com/office/drawing/2014/main" val="2915089595"/>
-                    </a:ext>
-                  </a:extLst>
-                </a:gridCol>
-                <a:gridCol w="2562296">
-                  <a:extLst>
-                    <a:ext uri="{9D8B030D-6E8A-4147-A177-3AD203B41FA5}">
-                      <a16:colId xmlns:a16="http://schemas.microsoft.com/office/drawing/2014/main" val="154001098"/>
-                    </a:ext>
-                  </a:extLst>
-                </a:gridCol>
-                <a:gridCol w="1487945">
-                  <a:extLst>
-                    <a:ext uri="{9D8B030D-6E8A-4147-A177-3AD203B41FA5}">
-                      <a16:colId xmlns:a16="http://schemas.microsoft.com/office/drawing/2014/main" val="213651550"/>
-                    </a:ext>
-                  </a:extLst>
-                </a:gridCol>
-                <a:gridCol w="1486703">
-                  <a:extLst>
-                    <a:ext uri="{9D8B030D-6E8A-4147-A177-3AD203B41FA5}">
-                      <a16:colId xmlns:a16="http://schemas.microsoft.com/office/drawing/2014/main" val="3218123369"/>
-                    </a:ext>
-                  </a:extLst>
-                </a:gridCol>
-              </a:tblGrid>
-              <a:tr h="409806">
-                <a:tc>
-                  <a:txBody>
-                    <a:bodyPr/>
-                    <a:lstStyle/>
-                    <a:p>
-                      <a:pPr marL="0" marR="0">
-                        <a:buNone/>
-                      </a:pPr>
-                      <a:r>
-                        <a:rPr lang="en-IN" sz="2000" kern="100">
-                          <a:effectLst/>
-                        </a:rPr>
-                        <a:t>Model</a:t>
-                      </a:r>
-                      <a:endParaRPr lang="en-US" sz="2000" kern="100">
-                        <a:effectLst/>
-                        <a:latin typeface="Calibri" panose="020F0502020204030204" pitchFamily="34" charset="0"/>
-                        <a:ea typeface="Times New Roman" panose="02020603050405020304" pitchFamily="18" charset="0"/>
-                        <a:cs typeface="Arial" panose="020B0604020202020204" pitchFamily="34" charset="0"/>
-                      </a:endParaRPr>
-                    </a:p>
-                  </a:txBody>
-                  <a:tcPr marL="68580" marR="68580" marT="0" marB="0" anchor="ctr"/>
-                </a:tc>
-                <a:tc>
-                  <a:txBody>
-                    <a:bodyPr/>
-                    <a:lstStyle/>
-                    <a:p>
-                      <a:pPr marL="0" marR="0">
-                        <a:buNone/>
-                      </a:pPr>
-                      <a:r>
-                        <a:rPr lang="en-IN" sz="2000" kern="100">
-                          <a:effectLst/>
-                        </a:rPr>
-                        <a:t>MAE</a:t>
-                      </a:r>
-                      <a:endParaRPr lang="en-US" sz="2000" kern="100">
-                        <a:effectLst/>
-                        <a:latin typeface="Calibri" panose="020F0502020204030204" pitchFamily="34" charset="0"/>
-                        <a:ea typeface="Times New Roman" panose="02020603050405020304" pitchFamily="18" charset="0"/>
-                        <a:cs typeface="Arial" panose="020B0604020202020204" pitchFamily="34" charset="0"/>
-                      </a:endParaRPr>
-                    </a:p>
-                  </a:txBody>
-                  <a:tcPr marL="68580" marR="68580" marT="0" marB="0" anchor="ctr"/>
-                </a:tc>
-                <a:tc>
-                  <a:txBody>
-                    <a:bodyPr/>
-                    <a:lstStyle/>
-                    <a:p>
-                      <a:pPr marL="0" marR="0">
-                        <a:buNone/>
-                      </a:pPr>
-                      <a:r>
-                        <a:rPr lang="en-IN" sz="2000" kern="100">
-                          <a:effectLst/>
-                        </a:rPr>
-                        <a:t>MSE</a:t>
-                      </a:r>
-                      <a:endParaRPr lang="en-US" sz="2000" kern="100">
-                        <a:effectLst/>
-                        <a:latin typeface="Calibri" panose="020F0502020204030204" pitchFamily="34" charset="0"/>
-                        <a:ea typeface="Times New Roman" panose="02020603050405020304" pitchFamily="18" charset="0"/>
-                        <a:cs typeface="Arial" panose="020B0604020202020204" pitchFamily="34" charset="0"/>
-                      </a:endParaRPr>
-                    </a:p>
-                  </a:txBody>
-                  <a:tcPr marL="68580" marR="68580" marT="0" marB="0" anchor="ctr"/>
-                </a:tc>
-                <a:tc>
-                  <a:txBody>
-                    <a:bodyPr/>
-                    <a:lstStyle/>
-                    <a:p>
-                      <a:pPr marL="0" marR="0">
-                        <a:buNone/>
-                      </a:pPr>
-                      <a:r>
-                        <a:rPr lang="en-IN" sz="2000" kern="100">
-                          <a:effectLst/>
-                        </a:rPr>
-                        <a:t>RMSE</a:t>
-                      </a:r>
-                      <a:endParaRPr lang="en-US" sz="2000" kern="100">
-                        <a:effectLst/>
-                        <a:latin typeface="Calibri" panose="020F0502020204030204" pitchFamily="34" charset="0"/>
-                        <a:ea typeface="Times New Roman" panose="02020603050405020304" pitchFamily="18" charset="0"/>
-                        <a:cs typeface="Arial" panose="020B0604020202020204" pitchFamily="34" charset="0"/>
-                      </a:endParaRPr>
-                    </a:p>
-                  </a:txBody>
-                  <a:tcPr marL="68580" marR="68580" marT="0" marB="0" anchor="ctr"/>
-                </a:tc>
-                <a:tc>
-                  <a:txBody>
-                    <a:bodyPr/>
-                    <a:lstStyle/>
-                    <a:p>
-                      <a:pPr marL="0" marR="0">
-                        <a:buNone/>
-                      </a:pPr>
-                      <a:r>
-                        <a:rPr lang="en-IN" sz="2000" kern="100">
-                          <a:effectLst/>
-                        </a:rPr>
-                        <a:t>AIC</a:t>
-                      </a:r>
-                      <a:endParaRPr lang="en-US" sz="2000" kern="100">
-                        <a:effectLst/>
-                        <a:latin typeface="Calibri" panose="020F0502020204030204" pitchFamily="34" charset="0"/>
-                        <a:ea typeface="Times New Roman" panose="02020603050405020304" pitchFamily="18" charset="0"/>
-                        <a:cs typeface="Arial" panose="020B0604020202020204" pitchFamily="34" charset="0"/>
-                      </a:endParaRPr>
-                    </a:p>
-                  </a:txBody>
-                  <a:tcPr marL="68580" marR="68580" marT="0" marB="0" anchor="ctr"/>
-                </a:tc>
-                <a:tc>
-                  <a:txBody>
-                    <a:bodyPr/>
-                    <a:lstStyle/>
-                    <a:p>
-                      <a:pPr marL="0" marR="0">
-                        <a:buNone/>
-                      </a:pPr>
-                      <a:r>
-                        <a:rPr lang="en-IN" sz="2000" kern="100">
-                          <a:effectLst/>
-                        </a:rPr>
-                        <a:t>BIC</a:t>
-                      </a:r>
-                      <a:endParaRPr lang="en-US" sz="2000" kern="100">
-                        <a:effectLst/>
-                        <a:latin typeface="Calibri" panose="020F0502020204030204" pitchFamily="34" charset="0"/>
-                        <a:ea typeface="Times New Roman" panose="02020603050405020304" pitchFamily="18" charset="0"/>
-                        <a:cs typeface="Arial" panose="020B0604020202020204" pitchFamily="34" charset="0"/>
-                      </a:endParaRPr>
-                    </a:p>
-                  </a:txBody>
-                  <a:tcPr marL="68580" marR="68580" marT="0" marB="0" anchor="ctr"/>
-                </a:tc>
-                <a:extLst>
-                  <a:ext uri="{0D108BD9-81ED-4DB2-BD59-A6C34878D82A}">
-                    <a16:rowId xmlns:a16="http://schemas.microsoft.com/office/drawing/2014/main" val="2955679452"/>
-                  </a:ext>
-                </a:extLst>
-              </a:tr>
-              <a:tr h="404192">
-                <a:tc>
-                  <a:txBody>
-                    <a:bodyPr/>
-                    <a:lstStyle/>
-                    <a:p>
-                      <a:pPr marL="0" marR="0">
-                        <a:buNone/>
-                      </a:pPr>
-                      <a:r>
-                        <a:rPr lang="en-IN" sz="2000" kern="100">
-                          <a:effectLst/>
-                        </a:rPr>
-                        <a:t>ARIMA</a:t>
-                      </a:r>
-                      <a:endParaRPr lang="en-US" sz="2000" kern="100">
-                        <a:effectLst/>
-                        <a:latin typeface="Calibri" panose="020F0502020204030204" pitchFamily="34" charset="0"/>
-                        <a:ea typeface="Times New Roman" panose="02020603050405020304" pitchFamily="18" charset="0"/>
-                        <a:cs typeface="Arial" panose="020B0604020202020204" pitchFamily="34" charset="0"/>
-                      </a:endParaRPr>
-                    </a:p>
-                  </a:txBody>
-                  <a:tcPr marL="68580" marR="68580" marT="0" marB="0" anchor="ctr"/>
-                </a:tc>
-                <a:tc>
-                  <a:txBody>
-                    <a:bodyPr/>
-                    <a:lstStyle/>
-                    <a:p>
-                      <a:pPr marL="0" marR="0">
-                        <a:buNone/>
-                      </a:pPr>
-                      <a:r>
-                        <a:rPr lang="en-IN" sz="2000" kern="100">
-                          <a:effectLst/>
-                        </a:rPr>
-                        <a:t>134,360.86</a:t>
-                      </a:r>
-                      <a:endParaRPr lang="en-US" sz="2000" kern="100">
-                        <a:effectLst/>
-                        <a:latin typeface="Calibri" panose="020F0502020204030204" pitchFamily="34" charset="0"/>
-                        <a:ea typeface="Times New Roman" panose="02020603050405020304" pitchFamily="18" charset="0"/>
-                        <a:cs typeface="Arial" panose="020B0604020202020204" pitchFamily="34" charset="0"/>
-                      </a:endParaRPr>
-                    </a:p>
-                  </a:txBody>
-                  <a:tcPr marL="68580" marR="68580" marT="0" marB="0" anchor="ctr"/>
-                </a:tc>
-                <a:tc>
-                  <a:txBody>
-                    <a:bodyPr/>
-                    <a:lstStyle/>
-                    <a:p>
-                      <a:pPr marL="0" marR="0">
-                        <a:buNone/>
-                      </a:pPr>
-                      <a:r>
-                        <a:rPr lang="en-IN" sz="2000" kern="100">
-                          <a:effectLst/>
-                        </a:rPr>
-                        <a:t>2.48e+10</a:t>
-                      </a:r>
-                      <a:endParaRPr lang="en-US" sz="2000" kern="100">
-                        <a:effectLst/>
-                        <a:latin typeface="Calibri" panose="020F0502020204030204" pitchFamily="34" charset="0"/>
-                        <a:ea typeface="Times New Roman" panose="02020603050405020304" pitchFamily="18" charset="0"/>
-                        <a:cs typeface="Arial" panose="020B0604020202020204" pitchFamily="34" charset="0"/>
-                      </a:endParaRPr>
-                    </a:p>
-                  </a:txBody>
-                  <a:tcPr marL="68580" marR="68580" marT="0" marB="0" anchor="ctr"/>
-                </a:tc>
-                <a:tc>
-                  <a:txBody>
-                    <a:bodyPr/>
-                    <a:lstStyle/>
-                    <a:p>
-                      <a:pPr marL="0" marR="0">
-                        <a:buNone/>
-                      </a:pPr>
-                      <a:r>
-                        <a:rPr lang="en-IN" sz="2000" kern="100" dirty="0">
-                          <a:effectLst/>
-                        </a:rPr>
-                        <a:t>157,527.53</a:t>
-                      </a:r>
-                      <a:endParaRPr lang="en-US" sz="2000" kern="100" dirty="0">
-                        <a:effectLst/>
-                        <a:latin typeface="Calibri" panose="020F0502020204030204" pitchFamily="34" charset="0"/>
-                        <a:ea typeface="Times New Roman" panose="02020603050405020304" pitchFamily="18" charset="0"/>
-                        <a:cs typeface="Arial" panose="020B0604020202020204" pitchFamily="34" charset="0"/>
-                      </a:endParaRPr>
-                    </a:p>
-                  </a:txBody>
-                  <a:tcPr marL="68580" marR="68580" marT="0" marB="0" anchor="ctr"/>
-                </a:tc>
-                <a:tc>
-                  <a:txBody>
-                    <a:bodyPr/>
-                    <a:lstStyle/>
-                    <a:p>
-                      <a:pPr marL="0" marR="0">
-                        <a:buNone/>
-                      </a:pPr>
-                      <a:r>
-                        <a:rPr lang="en-IN" sz="2000" kern="100">
-                          <a:effectLst/>
-                        </a:rPr>
-                        <a:t>3380.63</a:t>
-                      </a:r>
-                      <a:endParaRPr lang="en-US" sz="2000" kern="100">
-                        <a:effectLst/>
-                        <a:latin typeface="Calibri" panose="020F0502020204030204" pitchFamily="34" charset="0"/>
-                        <a:ea typeface="Times New Roman" panose="02020603050405020304" pitchFamily="18" charset="0"/>
-                        <a:cs typeface="Arial" panose="020B0604020202020204" pitchFamily="34" charset="0"/>
-                      </a:endParaRPr>
-                    </a:p>
-                  </a:txBody>
-                  <a:tcPr marL="68580" marR="68580" marT="0" marB="0" anchor="ctr"/>
-                </a:tc>
-                <a:tc>
-                  <a:txBody>
-                    <a:bodyPr/>
-                    <a:lstStyle/>
-                    <a:p>
-                      <a:pPr marL="0" marR="0">
-                        <a:buNone/>
-                      </a:pPr>
-                      <a:r>
-                        <a:rPr lang="en-IN" sz="2000" kern="100">
-                          <a:effectLst/>
-                        </a:rPr>
-                        <a:t>3397.55</a:t>
-                      </a:r>
-                      <a:endParaRPr lang="en-US" sz="2000" kern="100">
-                        <a:effectLst/>
-                        <a:latin typeface="Calibri" panose="020F0502020204030204" pitchFamily="34" charset="0"/>
-                        <a:ea typeface="Times New Roman" panose="02020603050405020304" pitchFamily="18" charset="0"/>
-                        <a:cs typeface="Arial" panose="020B0604020202020204" pitchFamily="34" charset="0"/>
-                      </a:endParaRPr>
-                    </a:p>
-                  </a:txBody>
-                  <a:tcPr marL="68580" marR="68580" marT="0" marB="0" anchor="ctr"/>
-                </a:tc>
-                <a:extLst>
-                  <a:ext uri="{0D108BD9-81ED-4DB2-BD59-A6C34878D82A}">
-                    <a16:rowId xmlns:a16="http://schemas.microsoft.com/office/drawing/2014/main" val="2401571199"/>
-                  </a:ext>
-                </a:extLst>
-              </a:tr>
-              <a:tr h="409806">
-                <a:tc>
-                  <a:txBody>
-                    <a:bodyPr/>
-                    <a:lstStyle/>
-                    <a:p>
-                      <a:pPr marL="0" marR="0">
-                        <a:buNone/>
-                      </a:pPr>
-                      <a:r>
-                        <a:rPr lang="en-IN" sz="2000" kern="100" dirty="0">
-                          <a:effectLst/>
-                        </a:rPr>
-                        <a:t>SARIMA</a:t>
-                      </a:r>
-                      <a:endParaRPr lang="en-US" sz="2000" kern="100" dirty="0">
-                        <a:effectLst/>
-                        <a:latin typeface="Calibri" panose="020F0502020204030204" pitchFamily="34" charset="0"/>
-                        <a:ea typeface="Times New Roman" panose="02020603050405020304" pitchFamily="18" charset="0"/>
-                        <a:cs typeface="Arial" panose="020B0604020202020204" pitchFamily="34" charset="0"/>
-                      </a:endParaRPr>
-                    </a:p>
-                  </a:txBody>
-                  <a:tcPr marL="68580" marR="68580" marT="0" marB="0" anchor="ctr"/>
-                </a:tc>
-                <a:tc>
-                  <a:txBody>
-                    <a:bodyPr/>
-                    <a:lstStyle/>
-                    <a:p>
-                      <a:pPr marL="0" marR="0">
-                        <a:buNone/>
-                      </a:pPr>
-                      <a:r>
-                        <a:rPr lang="en-IN" sz="2000" kern="100">
-                          <a:effectLst/>
-                        </a:rPr>
-                        <a:t>97,100.10</a:t>
-                      </a:r>
-                      <a:endParaRPr lang="en-US" sz="2000" kern="100">
-                        <a:effectLst/>
-                        <a:latin typeface="Calibri" panose="020F0502020204030204" pitchFamily="34" charset="0"/>
-                        <a:ea typeface="Times New Roman" panose="02020603050405020304" pitchFamily="18" charset="0"/>
-                        <a:cs typeface="Arial" panose="020B0604020202020204" pitchFamily="34" charset="0"/>
-                      </a:endParaRPr>
-                    </a:p>
-                  </a:txBody>
-                  <a:tcPr marL="68580" marR="68580" marT="0" marB="0" anchor="ctr"/>
-                </a:tc>
-                <a:tc>
-                  <a:txBody>
-                    <a:bodyPr/>
-                    <a:lstStyle/>
-                    <a:p>
-                      <a:pPr marL="0" marR="0">
-                        <a:buNone/>
-                      </a:pPr>
-                      <a:r>
-                        <a:rPr lang="en-IN" sz="2000" kern="100">
-                          <a:effectLst/>
-                        </a:rPr>
-                        <a:t>1.64e+10</a:t>
-                      </a:r>
-                      <a:endParaRPr lang="en-US" sz="2000" kern="100">
-                        <a:effectLst/>
-                        <a:latin typeface="Calibri" panose="020F0502020204030204" pitchFamily="34" charset="0"/>
-                        <a:ea typeface="Times New Roman" panose="02020603050405020304" pitchFamily="18" charset="0"/>
-                        <a:cs typeface="Arial" panose="020B0604020202020204" pitchFamily="34" charset="0"/>
-                      </a:endParaRPr>
-                    </a:p>
-                  </a:txBody>
-                  <a:tcPr marL="68580" marR="68580" marT="0" marB="0" anchor="ctr"/>
-                </a:tc>
-                <a:tc>
-                  <a:txBody>
-                    <a:bodyPr/>
-                    <a:lstStyle/>
-                    <a:p>
-                      <a:pPr marL="0" marR="0">
-                        <a:buNone/>
-                      </a:pPr>
-                      <a:r>
-                        <a:rPr lang="en-IN" sz="2000" kern="100">
-                          <a:effectLst/>
-                        </a:rPr>
-                        <a:t>128,000.76</a:t>
-                      </a:r>
-                      <a:endParaRPr lang="en-US" sz="2000" kern="100">
-                        <a:effectLst/>
-                        <a:latin typeface="Calibri" panose="020F0502020204030204" pitchFamily="34" charset="0"/>
-                        <a:ea typeface="Times New Roman" panose="02020603050405020304" pitchFamily="18" charset="0"/>
-                        <a:cs typeface="Arial" panose="020B0604020202020204" pitchFamily="34" charset="0"/>
-                      </a:endParaRPr>
-                    </a:p>
-                  </a:txBody>
-                  <a:tcPr marL="68580" marR="68580" marT="0" marB="0" anchor="ctr"/>
-                </a:tc>
-                <a:tc>
-                  <a:txBody>
-                    <a:bodyPr/>
-                    <a:lstStyle/>
-                    <a:p>
-                      <a:pPr marL="0" marR="0">
-                        <a:buNone/>
-                      </a:pPr>
-                      <a:r>
-                        <a:rPr lang="en-IN" sz="2000" kern="100">
-                          <a:effectLst/>
-                        </a:rPr>
-                        <a:t>3462.81</a:t>
-                      </a:r>
-                      <a:endParaRPr lang="en-US" sz="2000" kern="100">
-                        <a:effectLst/>
-                        <a:latin typeface="Calibri" panose="020F0502020204030204" pitchFamily="34" charset="0"/>
-                        <a:ea typeface="Times New Roman" panose="02020603050405020304" pitchFamily="18" charset="0"/>
-                        <a:cs typeface="Arial" panose="020B0604020202020204" pitchFamily="34" charset="0"/>
-                      </a:endParaRPr>
-                    </a:p>
-                  </a:txBody>
-                  <a:tcPr marL="68580" marR="68580" marT="0" marB="0" anchor="ctr"/>
-                </a:tc>
-                <a:tc>
-                  <a:txBody>
-                    <a:bodyPr/>
-                    <a:lstStyle/>
-                    <a:p>
-                      <a:pPr marL="0" marR="0">
-                        <a:buNone/>
-                      </a:pPr>
-                      <a:r>
-                        <a:rPr lang="en-IN" sz="2000" kern="100">
-                          <a:effectLst/>
-                        </a:rPr>
-                        <a:t>3474.15</a:t>
-                      </a:r>
-                      <a:endParaRPr lang="en-US" sz="2000" kern="100">
-                        <a:effectLst/>
-                        <a:latin typeface="Calibri" panose="020F0502020204030204" pitchFamily="34" charset="0"/>
-                        <a:ea typeface="Times New Roman" panose="02020603050405020304" pitchFamily="18" charset="0"/>
-                        <a:cs typeface="Arial" panose="020B0604020202020204" pitchFamily="34" charset="0"/>
-                      </a:endParaRPr>
-                    </a:p>
-                  </a:txBody>
-                  <a:tcPr marL="68580" marR="68580" marT="0" marB="0" anchor="ctr"/>
-                </a:tc>
-                <a:extLst>
-                  <a:ext uri="{0D108BD9-81ED-4DB2-BD59-A6C34878D82A}">
-                    <a16:rowId xmlns:a16="http://schemas.microsoft.com/office/drawing/2014/main" val="524256932"/>
-                  </a:ext>
-                </a:extLst>
-              </a:tr>
-              <a:tr h="822419">
-                <a:tc>
-                  <a:txBody>
-                    <a:bodyPr/>
-                    <a:lstStyle/>
-                    <a:p>
-                      <a:pPr marL="0" marR="0">
-                        <a:buNone/>
-                      </a:pPr>
-                      <a:r>
-                        <a:rPr lang="en-IN" sz="2000" kern="100">
-                          <a:effectLst/>
-                        </a:rPr>
-                        <a:t>EXOG SARIMA</a:t>
-                      </a:r>
-                      <a:endParaRPr lang="en-US" sz="2000" kern="100">
-                        <a:effectLst/>
-                        <a:latin typeface="Calibri" panose="020F0502020204030204" pitchFamily="34" charset="0"/>
-                        <a:ea typeface="Times New Roman" panose="02020603050405020304" pitchFamily="18" charset="0"/>
-                        <a:cs typeface="Arial" panose="020B0604020202020204" pitchFamily="34" charset="0"/>
-                      </a:endParaRPr>
-                    </a:p>
-                  </a:txBody>
-                  <a:tcPr marL="68580" marR="68580" marT="0" marB="0" anchor="ctr"/>
-                </a:tc>
-                <a:tc>
-                  <a:txBody>
-                    <a:bodyPr/>
-                    <a:lstStyle/>
-                    <a:p>
-                      <a:pPr marL="0" marR="0">
-                        <a:buNone/>
-                      </a:pPr>
-                      <a:r>
-                        <a:rPr lang="en-IN" sz="2000" kern="100">
-                          <a:effectLst/>
-                        </a:rPr>
-                        <a:t>79,852.14</a:t>
-                      </a:r>
-                      <a:endParaRPr lang="en-US" sz="2000" kern="100">
-                        <a:effectLst/>
-                        <a:latin typeface="Calibri" panose="020F0502020204030204" pitchFamily="34" charset="0"/>
-                        <a:ea typeface="Times New Roman" panose="02020603050405020304" pitchFamily="18" charset="0"/>
-                        <a:cs typeface="Arial" panose="020B0604020202020204" pitchFamily="34" charset="0"/>
-                      </a:endParaRPr>
-                    </a:p>
-                  </a:txBody>
-                  <a:tcPr marL="68580" marR="68580" marT="0" marB="0" anchor="ctr"/>
-                </a:tc>
-                <a:tc>
-                  <a:txBody>
-                    <a:bodyPr/>
-                    <a:lstStyle/>
-                    <a:p>
-                      <a:pPr marL="0" marR="0">
-                        <a:buNone/>
-                      </a:pPr>
-                      <a:r>
-                        <a:rPr lang="en-IN" sz="2000" kern="100">
-                          <a:effectLst/>
-                        </a:rPr>
-                        <a:t>8.67e+9</a:t>
-                      </a:r>
-                      <a:endParaRPr lang="en-US" sz="2000" kern="100">
-                        <a:effectLst/>
-                        <a:latin typeface="Calibri" panose="020F0502020204030204" pitchFamily="34" charset="0"/>
-                        <a:ea typeface="Times New Roman" panose="02020603050405020304" pitchFamily="18" charset="0"/>
-                        <a:cs typeface="Arial" panose="020B0604020202020204" pitchFamily="34" charset="0"/>
-                      </a:endParaRPr>
-                    </a:p>
-                  </a:txBody>
-                  <a:tcPr marL="68580" marR="68580" marT="0" marB="0" anchor="ctr"/>
-                </a:tc>
-                <a:tc>
-                  <a:txBody>
-                    <a:bodyPr/>
-                    <a:lstStyle/>
-                    <a:p>
-                      <a:pPr marL="0" marR="0">
-                        <a:buNone/>
-                      </a:pPr>
-                      <a:r>
-                        <a:rPr lang="en-IN" sz="2000" kern="100">
-                          <a:effectLst/>
-                        </a:rPr>
-                        <a:t>93,150.65</a:t>
-                      </a:r>
-                      <a:endParaRPr lang="en-US" sz="2000" kern="100">
-                        <a:effectLst/>
-                        <a:latin typeface="Calibri" panose="020F0502020204030204" pitchFamily="34" charset="0"/>
-                        <a:ea typeface="Times New Roman" panose="02020603050405020304" pitchFamily="18" charset="0"/>
-                        <a:cs typeface="Arial" panose="020B0604020202020204" pitchFamily="34" charset="0"/>
-                      </a:endParaRPr>
-                    </a:p>
-                  </a:txBody>
-                  <a:tcPr marL="68580" marR="68580" marT="0" marB="0" anchor="ctr"/>
-                </a:tc>
-                <a:tc>
-                  <a:txBody>
-                    <a:bodyPr/>
-                    <a:lstStyle/>
-                    <a:p>
-                      <a:pPr marL="0" marR="0">
-                        <a:buNone/>
-                      </a:pPr>
-                      <a:r>
-                        <a:rPr lang="en-IN" sz="2000" kern="100">
-                          <a:effectLst/>
-                        </a:rPr>
-                        <a:t>3669.55</a:t>
-                      </a:r>
-                      <a:endParaRPr lang="en-US" sz="2000" kern="100">
-                        <a:effectLst/>
-                        <a:latin typeface="Calibri" panose="020F0502020204030204" pitchFamily="34" charset="0"/>
-                        <a:ea typeface="Times New Roman" panose="02020603050405020304" pitchFamily="18" charset="0"/>
-                        <a:cs typeface="Arial" panose="020B0604020202020204" pitchFamily="34" charset="0"/>
-                      </a:endParaRPr>
-                    </a:p>
-                  </a:txBody>
-                  <a:tcPr marL="68580" marR="68580" marT="0" marB="0" anchor="ctr"/>
-                </a:tc>
-                <a:tc>
-                  <a:txBody>
-                    <a:bodyPr/>
-                    <a:lstStyle/>
-                    <a:p>
-                      <a:pPr marL="0" marR="0">
-                        <a:buNone/>
-                      </a:pPr>
-                      <a:r>
-                        <a:rPr lang="en-IN" sz="2000" kern="100">
-                          <a:effectLst/>
-                        </a:rPr>
-                        <a:t>3689.84</a:t>
-                      </a:r>
-                      <a:endParaRPr lang="en-US" sz="2000" kern="100">
-                        <a:effectLst/>
-                        <a:latin typeface="Calibri" panose="020F0502020204030204" pitchFamily="34" charset="0"/>
-                        <a:ea typeface="Times New Roman" panose="02020603050405020304" pitchFamily="18" charset="0"/>
-                        <a:cs typeface="Arial" panose="020B0604020202020204" pitchFamily="34" charset="0"/>
-                      </a:endParaRPr>
-                    </a:p>
-                  </a:txBody>
-                  <a:tcPr marL="68580" marR="68580" marT="0" marB="0" anchor="ctr"/>
-                </a:tc>
-                <a:extLst>
-                  <a:ext uri="{0D108BD9-81ED-4DB2-BD59-A6C34878D82A}">
-                    <a16:rowId xmlns:a16="http://schemas.microsoft.com/office/drawing/2014/main" val="3327466149"/>
-                  </a:ext>
-                </a:extLst>
-              </a:tr>
-              <a:tr h="808383">
-                <a:tc>
-                  <a:txBody>
-                    <a:bodyPr/>
-                    <a:lstStyle/>
-                    <a:p>
-                      <a:pPr marL="0" marR="0">
-                        <a:buNone/>
-                      </a:pPr>
-                      <a:r>
-                        <a:rPr lang="en-IN" sz="2000" kern="100">
-                          <a:effectLst/>
-                        </a:rPr>
-                        <a:t>Random Forest</a:t>
-                      </a:r>
-                      <a:endParaRPr lang="en-US" sz="2000" kern="100">
-                        <a:effectLst/>
-                        <a:latin typeface="Calibri" panose="020F0502020204030204" pitchFamily="34" charset="0"/>
-                        <a:ea typeface="Times New Roman" panose="02020603050405020304" pitchFamily="18" charset="0"/>
-                        <a:cs typeface="Arial" panose="020B0604020202020204" pitchFamily="34" charset="0"/>
-                      </a:endParaRPr>
-                    </a:p>
-                  </a:txBody>
-                  <a:tcPr marL="68580" marR="68580" marT="0" marB="0" anchor="ctr"/>
-                </a:tc>
-                <a:tc>
-                  <a:txBody>
-                    <a:bodyPr/>
-                    <a:lstStyle/>
-                    <a:p>
-                      <a:pPr marL="0" marR="0">
-                        <a:buNone/>
-                      </a:pPr>
-                      <a:r>
-                        <a:rPr lang="en-IN" sz="2000" kern="100">
-                          <a:effectLst/>
-                        </a:rPr>
-                        <a:t>68,322.60</a:t>
-                      </a:r>
-                      <a:endParaRPr lang="en-US" sz="2000" kern="100">
-                        <a:effectLst/>
-                        <a:latin typeface="Calibri" panose="020F0502020204030204" pitchFamily="34" charset="0"/>
-                        <a:ea typeface="Times New Roman" panose="02020603050405020304" pitchFamily="18" charset="0"/>
-                        <a:cs typeface="Arial" panose="020B0604020202020204" pitchFamily="34" charset="0"/>
-                      </a:endParaRPr>
-                    </a:p>
-                  </a:txBody>
-                  <a:tcPr marL="68580" marR="68580" marT="0" marB="0" anchor="ctr"/>
-                </a:tc>
-                <a:tc>
-                  <a:txBody>
-                    <a:bodyPr/>
-                    <a:lstStyle/>
-                    <a:p>
-                      <a:pPr marL="0" marR="0">
-                        <a:buNone/>
-                      </a:pPr>
-                      <a:r>
-                        <a:rPr lang="en-IN" sz="2000" kern="100">
-                          <a:effectLst/>
-                        </a:rPr>
-                        <a:t>6.6e+9</a:t>
-                      </a:r>
-                      <a:endParaRPr lang="en-US" sz="2000" kern="100">
-                        <a:effectLst/>
-                        <a:latin typeface="Calibri" panose="020F0502020204030204" pitchFamily="34" charset="0"/>
-                        <a:ea typeface="Times New Roman" panose="02020603050405020304" pitchFamily="18" charset="0"/>
-                        <a:cs typeface="Arial" panose="020B0604020202020204" pitchFamily="34" charset="0"/>
-                      </a:endParaRPr>
-                    </a:p>
-                  </a:txBody>
-                  <a:tcPr marL="68580" marR="68580" marT="0" marB="0" anchor="ctr"/>
-                </a:tc>
-                <a:tc>
-                  <a:txBody>
-                    <a:bodyPr/>
-                    <a:lstStyle/>
-                    <a:p>
-                      <a:pPr marL="0" marR="0">
-                        <a:buNone/>
-                      </a:pPr>
-                      <a:r>
-                        <a:rPr lang="en-IN" sz="2000" kern="100">
-                          <a:effectLst/>
-                        </a:rPr>
-                        <a:t>81348.77</a:t>
-                      </a:r>
-                      <a:endParaRPr lang="en-US" sz="2000" kern="100">
-                        <a:effectLst/>
-                        <a:latin typeface="Calibri" panose="020F0502020204030204" pitchFamily="34" charset="0"/>
-                        <a:ea typeface="Times New Roman" panose="02020603050405020304" pitchFamily="18" charset="0"/>
-                        <a:cs typeface="Arial" panose="020B0604020202020204" pitchFamily="34" charset="0"/>
-                      </a:endParaRPr>
-                    </a:p>
-                  </a:txBody>
-                  <a:tcPr marL="68580" marR="68580" marT="0" marB="0" anchor="ctr"/>
-                </a:tc>
-                <a:tc>
-                  <a:txBody>
-                    <a:bodyPr/>
-                    <a:lstStyle/>
-                    <a:p>
-                      <a:pPr marL="0" marR="0">
-                        <a:buNone/>
-                      </a:pPr>
-                      <a:r>
-                        <a:rPr lang="en-IN" sz="2000" kern="100">
-                          <a:effectLst/>
-                        </a:rPr>
-                        <a:t>N/A</a:t>
-                      </a:r>
-                      <a:endParaRPr lang="en-US" sz="2000" kern="100">
-                        <a:effectLst/>
-                        <a:latin typeface="Calibri" panose="020F0502020204030204" pitchFamily="34" charset="0"/>
-                        <a:ea typeface="Times New Roman" panose="02020603050405020304" pitchFamily="18" charset="0"/>
-                        <a:cs typeface="Arial" panose="020B0604020202020204" pitchFamily="34" charset="0"/>
-                      </a:endParaRPr>
-                    </a:p>
-                  </a:txBody>
-                  <a:tcPr marL="68580" marR="68580" marT="0" marB="0" anchor="ctr"/>
-                </a:tc>
-                <a:tc>
-                  <a:txBody>
-                    <a:bodyPr/>
-                    <a:lstStyle/>
-                    <a:p>
-                      <a:pPr marL="0" marR="0">
-                        <a:buNone/>
-                      </a:pPr>
-                      <a:r>
-                        <a:rPr lang="en-IN" sz="2000" kern="100">
-                          <a:effectLst/>
-                        </a:rPr>
-                        <a:t>N/A</a:t>
-                      </a:r>
-                      <a:endParaRPr lang="en-US" sz="2000" kern="100">
-                        <a:effectLst/>
-                        <a:latin typeface="Calibri" panose="020F0502020204030204" pitchFamily="34" charset="0"/>
-                        <a:ea typeface="Times New Roman" panose="02020603050405020304" pitchFamily="18" charset="0"/>
-                        <a:cs typeface="Arial" panose="020B0604020202020204" pitchFamily="34" charset="0"/>
-                      </a:endParaRPr>
-                    </a:p>
-                  </a:txBody>
-                  <a:tcPr marL="68580" marR="68580" marT="0" marB="0" anchor="ctr"/>
-                </a:tc>
-                <a:extLst>
-                  <a:ext uri="{0D108BD9-81ED-4DB2-BD59-A6C34878D82A}">
-                    <a16:rowId xmlns:a16="http://schemas.microsoft.com/office/drawing/2014/main" val="191431410"/>
-                  </a:ext>
-                </a:extLst>
-              </a:tr>
-              <a:tr h="409806">
-                <a:tc>
-                  <a:txBody>
-                    <a:bodyPr/>
-                    <a:lstStyle/>
-                    <a:p>
-                      <a:pPr marL="0" marR="0">
-                        <a:buNone/>
-                      </a:pPr>
-                      <a:r>
-                        <a:rPr lang="en-IN" sz="2000" kern="100">
-                          <a:effectLst/>
-                        </a:rPr>
-                        <a:t>XGBoost</a:t>
-                      </a:r>
-                      <a:endParaRPr lang="en-US" sz="2000" kern="100">
-                        <a:effectLst/>
-                        <a:latin typeface="Calibri" panose="020F0502020204030204" pitchFamily="34" charset="0"/>
-                        <a:ea typeface="Times New Roman" panose="02020603050405020304" pitchFamily="18" charset="0"/>
-                        <a:cs typeface="Arial" panose="020B0604020202020204" pitchFamily="34" charset="0"/>
-                      </a:endParaRPr>
-                    </a:p>
-                  </a:txBody>
-                  <a:tcPr marL="68580" marR="68580" marT="0" marB="0" anchor="ctr"/>
-                </a:tc>
-                <a:tc>
-                  <a:txBody>
-                    <a:bodyPr/>
-                    <a:lstStyle/>
-                    <a:p>
-                      <a:pPr marL="0" marR="0">
-                        <a:buNone/>
-                      </a:pPr>
-                      <a:r>
-                        <a:rPr lang="en-IN" sz="2000" kern="100">
-                          <a:effectLst/>
-                        </a:rPr>
-                        <a:t>122,012.04</a:t>
-                      </a:r>
-                      <a:endParaRPr lang="en-US" sz="2000" kern="100">
-                        <a:effectLst/>
-                        <a:latin typeface="Calibri" panose="020F0502020204030204" pitchFamily="34" charset="0"/>
-                        <a:ea typeface="Times New Roman" panose="02020603050405020304" pitchFamily="18" charset="0"/>
-                        <a:cs typeface="Arial" panose="020B0604020202020204" pitchFamily="34" charset="0"/>
-                      </a:endParaRPr>
-                    </a:p>
-                  </a:txBody>
-                  <a:tcPr marL="68580" marR="68580" marT="0" marB="0" anchor="ctr"/>
-                </a:tc>
-                <a:tc>
-                  <a:txBody>
-                    <a:bodyPr/>
-                    <a:lstStyle/>
-                    <a:p>
-                      <a:pPr marL="0" marR="0">
-                        <a:buNone/>
-                      </a:pPr>
-                      <a:r>
-                        <a:rPr lang="en-IN" sz="2000" kern="100">
-                          <a:effectLst/>
-                        </a:rPr>
-                        <a:t>3.28e+10</a:t>
-                      </a:r>
-                      <a:endParaRPr lang="en-US" sz="2000" kern="100">
-                        <a:effectLst/>
-                        <a:latin typeface="Calibri" panose="020F0502020204030204" pitchFamily="34" charset="0"/>
-                        <a:ea typeface="Times New Roman" panose="02020603050405020304" pitchFamily="18" charset="0"/>
-                        <a:cs typeface="Arial" panose="020B0604020202020204" pitchFamily="34" charset="0"/>
-                      </a:endParaRPr>
-                    </a:p>
-                  </a:txBody>
-                  <a:tcPr marL="68580" marR="68580" marT="0" marB="0" anchor="ctr"/>
-                </a:tc>
-                <a:tc>
-                  <a:txBody>
-                    <a:bodyPr/>
-                    <a:lstStyle/>
-                    <a:p>
-                      <a:pPr marL="0" marR="0">
-                        <a:buNone/>
-                      </a:pPr>
-                      <a:r>
-                        <a:rPr lang="en-IN" sz="2000" kern="100">
-                          <a:effectLst/>
-                        </a:rPr>
-                        <a:t>181259.3</a:t>
-                      </a:r>
-                      <a:endParaRPr lang="en-US" sz="2000" kern="100">
-                        <a:effectLst/>
-                        <a:latin typeface="Calibri" panose="020F0502020204030204" pitchFamily="34" charset="0"/>
-                        <a:ea typeface="Times New Roman" panose="02020603050405020304" pitchFamily="18" charset="0"/>
-                        <a:cs typeface="Arial" panose="020B0604020202020204" pitchFamily="34" charset="0"/>
-                      </a:endParaRPr>
-                    </a:p>
-                  </a:txBody>
-                  <a:tcPr marL="68580" marR="68580" marT="0" marB="0" anchor="ctr"/>
-                </a:tc>
-                <a:tc>
-                  <a:txBody>
-                    <a:bodyPr/>
-                    <a:lstStyle/>
-                    <a:p>
-                      <a:pPr marL="0" marR="0">
-                        <a:buNone/>
-                      </a:pPr>
-                      <a:r>
-                        <a:rPr lang="en-IN" sz="2000" kern="100">
-                          <a:effectLst/>
-                        </a:rPr>
-                        <a:t>N/A</a:t>
-                      </a:r>
-                      <a:endParaRPr lang="en-US" sz="2000" kern="100">
-                        <a:effectLst/>
-                        <a:latin typeface="Calibri" panose="020F0502020204030204" pitchFamily="34" charset="0"/>
-                        <a:ea typeface="Times New Roman" panose="02020603050405020304" pitchFamily="18" charset="0"/>
-                        <a:cs typeface="Arial" panose="020B0604020202020204" pitchFamily="34" charset="0"/>
-                      </a:endParaRPr>
-                    </a:p>
-                  </a:txBody>
-                  <a:tcPr marL="68580" marR="68580" marT="0" marB="0" anchor="ctr"/>
-                </a:tc>
-                <a:tc>
-                  <a:txBody>
-                    <a:bodyPr/>
-                    <a:lstStyle/>
-                    <a:p>
-                      <a:pPr marL="0" marR="0">
-                        <a:buNone/>
-                      </a:pPr>
-                      <a:r>
-                        <a:rPr lang="en-IN" sz="2000" kern="100">
-                          <a:effectLst/>
-                        </a:rPr>
-                        <a:t>N/A</a:t>
-                      </a:r>
-                      <a:endParaRPr lang="en-US" sz="2000" kern="100">
-                        <a:effectLst/>
-                        <a:latin typeface="Calibri" panose="020F0502020204030204" pitchFamily="34" charset="0"/>
-                        <a:ea typeface="Times New Roman" panose="02020603050405020304" pitchFamily="18" charset="0"/>
-                        <a:cs typeface="Arial" panose="020B0604020202020204" pitchFamily="34" charset="0"/>
-                      </a:endParaRPr>
-                    </a:p>
-                  </a:txBody>
-                  <a:tcPr marL="68580" marR="68580" marT="0" marB="0" anchor="ctr"/>
-                </a:tc>
-                <a:extLst>
-                  <a:ext uri="{0D108BD9-81ED-4DB2-BD59-A6C34878D82A}">
-                    <a16:rowId xmlns:a16="http://schemas.microsoft.com/office/drawing/2014/main" val="2525313274"/>
-                  </a:ext>
-                </a:extLst>
-              </a:tr>
-              <a:tr h="822419">
-                <a:tc>
-                  <a:txBody>
-                    <a:bodyPr/>
-                    <a:lstStyle/>
-                    <a:p>
-                      <a:pPr marL="0" marR="0">
-                        <a:buNone/>
-                      </a:pPr>
-                      <a:r>
-                        <a:rPr lang="en-IN" sz="2000" kern="100">
-                          <a:effectLst/>
-                        </a:rPr>
-                        <a:t>LSTM (Training)</a:t>
-                      </a:r>
-                      <a:endParaRPr lang="en-US" sz="2000" kern="100">
-                        <a:effectLst/>
-                        <a:latin typeface="Calibri" panose="020F0502020204030204" pitchFamily="34" charset="0"/>
-                        <a:ea typeface="Times New Roman" panose="02020603050405020304" pitchFamily="18" charset="0"/>
-                        <a:cs typeface="Arial" panose="020B0604020202020204" pitchFamily="34" charset="0"/>
-                      </a:endParaRPr>
-                    </a:p>
-                  </a:txBody>
-                  <a:tcPr marL="68580" marR="68580" marT="0" marB="0" anchor="ctr"/>
-                </a:tc>
-                <a:tc>
-                  <a:txBody>
-                    <a:bodyPr/>
-                    <a:lstStyle/>
-                    <a:p>
-                      <a:pPr marL="0" marR="0">
-                        <a:buNone/>
-                      </a:pPr>
-                      <a:r>
-                        <a:rPr lang="en-IN" sz="2000" kern="100">
-                          <a:effectLst/>
-                        </a:rPr>
-                        <a:t>81,126.04</a:t>
-                      </a:r>
-                      <a:endParaRPr lang="en-US" sz="2000" kern="100">
-                        <a:effectLst/>
-                        <a:latin typeface="Calibri" panose="020F0502020204030204" pitchFamily="34" charset="0"/>
-                        <a:ea typeface="Times New Roman" panose="02020603050405020304" pitchFamily="18" charset="0"/>
-                        <a:cs typeface="Arial" panose="020B0604020202020204" pitchFamily="34" charset="0"/>
-                      </a:endParaRPr>
-                    </a:p>
-                  </a:txBody>
-                  <a:tcPr marL="68580" marR="68580" marT="0" marB="0" anchor="ctr"/>
-                </a:tc>
-                <a:tc>
-                  <a:txBody>
-                    <a:bodyPr/>
-                    <a:lstStyle/>
-                    <a:p>
-                      <a:pPr marL="0" marR="0">
-                        <a:buNone/>
-                      </a:pPr>
-                      <a:r>
-                        <a:rPr lang="en-IN" sz="2000" kern="100">
-                          <a:effectLst/>
-                        </a:rPr>
-                        <a:t>3.43e+10</a:t>
-                      </a:r>
-                      <a:endParaRPr lang="en-US" sz="2000" kern="100">
-                        <a:effectLst/>
-                        <a:latin typeface="Calibri" panose="020F0502020204030204" pitchFamily="34" charset="0"/>
-                        <a:ea typeface="Times New Roman" panose="02020603050405020304" pitchFamily="18" charset="0"/>
-                        <a:cs typeface="Arial" panose="020B0604020202020204" pitchFamily="34" charset="0"/>
-                      </a:endParaRPr>
-                    </a:p>
-                  </a:txBody>
-                  <a:tcPr marL="68580" marR="68580" marT="0" marB="0" anchor="ctr"/>
-                </a:tc>
-                <a:tc>
-                  <a:txBody>
-                    <a:bodyPr/>
-                    <a:lstStyle/>
-                    <a:p>
-                      <a:pPr marL="0" marR="0">
-                        <a:buNone/>
-                      </a:pPr>
-                      <a:r>
-                        <a:rPr lang="en-IN" sz="2000" kern="100">
-                          <a:effectLst/>
-                        </a:rPr>
-                        <a:t>185,258.85</a:t>
-                      </a:r>
-                      <a:endParaRPr lang="en-US" sz="2000" kern="100">
-                        <a:effectLst/>
-                        <a:latin typeface="Calibri" panose="020F0502020204030204" pitchFamily="34" charset="0"/>
-                        <a:ea typeface="Times New Roman" panose="02020603050405020304" pitchFamily="18" charset="0"/>
-                        <a:cs typeface="Arial" panose="020B0604020202020204" pitchFamily="34" charset="0"/>
-                      </a:endParaRPr>
-                    </a:p>
-                  </a:txBody>
-                  <a:tcPr marL="68580" marR="68580" marT="0" marB="0" anchor="ctr"/>
-                </a:tc>
-                <a:tc>
-                  <a:txBody>
-                    <a:bodyPr/>
-                    <a:lstStyle/>
-                    <a:p>
-                      <a:pPr marL="0" marR="0">
-                        <a:buNone/>
-                      </a:pPr>
-                      <a:r>
-                        <a:rPr lang="en-IN" sz="2000" kern="100">
-                          <a:effectLst/>
-                        </a:rPr>
-                        <a:t>N/A</a:t>
-                      </a:r>
-                      <a:endParaRPr lang="en-US" sz="2000" kern="100">
-                        <a:effectLst/>
-                        <a:latin typeface="Calibri" panose="020F0502020204030204" pitchFamily="34" charset="0"/>
-                        <a:ea typeface="Times New Roman" panose="02020603050405020304" pitchFamily="18" charset="0"/>
-                        <a:cs typeface="Arial" panose="020B0604020202020204" pitchFamily="34" charset="0"/>
-                      </a:endParaRPr>
-                    </a:p>
-                  </a:txBody>
-                  <a:tcPr marL="68580" marR="68580" marT="0" marB="0" anchor="ctr"/>
-                </a:tc>
-                <a:tc>
-                  <a:txBody>
-                    <a:bodyPr/>
-                    <a:lstStyle/>
-                    <a:p>
-                      <a:pPr marL="0" marR="0">
-                        <a:buNone/>
-                      </a:pPr>
-                      <a:r>
-                        <a:rPr lang="en-IN" sz="2000" kern="100">
-                          <a:effectLst/>
-                        </a:rPr>
-                        <a:t>N/A</a:t>
-                      </a:r>
-                      <a:endParaRPr lang="en-US" sz="2000" kern="100">
-                        <a:effectLst/>
-                        <a:latin typeface="Calibri" panose="020F0502020204030204" pitchFamily="34" charset="0"/>
-                        <a:ea typeface="Times New Roman" panose="02020603050405020304" pitchFamily="18" charset="0"/>
-                        <a:cs typeface="Arial" panose="020B0604020202020204" pitchFamily="34" charset="0"/>
-                      </a:endParaRPr>
-                    </a:p>
-                  </a:txBody>
-                  <a:tcPr marL="68580" marR="68580" marT="0" marB="0" anchor="ctr"/>
-                </a:tc>
-                <a:extLst>
-                  <a:ext uri="{0D108BD9-81ED-4DB2-BD59-A6C34878D82A}">
-                    <a16:rowId xmlns:a16="http://schemas.microsoft.com/office/drawing/2014/main" val="4217526785"/>
-                  </a:ext>
-                </a:extLst>
-              </a:tr>
-              <a:tr h="799963">
-                <a:tc>
-                  <a:txBody>
-                    <a:bodyPr/>
-                    <a:lstStyle/>
-                    <a:p>
-                      <a:pPr marL="0" marR="0">
-                        <a:buNone/>
-                      </a:pPr>
-                      <a:r>
-                        <a:rPr lang="en-IN" sz="2000" kern="100">
-                          <a:effectLst/>
-                        </a:rPr>
-                        <a:t>LSTM (Test)</a:t>
-                      </a:r>
-                      <a:endParaRPr lang="en-US" sz="2000" kern="100">
-                        <a:effectLst/>
-                        <a:latin typeface="Calibri" panose="020F0502020204030204" pitchFamily="34" charset="0"/>
-                        <a:ea typeface="Times New Roman" panose="02020603050405020304" pitchFamily="18" charset="0"/>
-                        <a:cs typeface="Arial" panose="020B0604020202020204" pitchFamily="34" charset="0"/>
-                      </a:endParaRPr>
-                    </a:p>
-                  </a:txBody>
-                  <a:tcPr marL="68580" marR="68580" marT="0" marB="0" anchor="ctr"/>
-                </a:tc>
-                <a:tc>
-                  <a:txBody>
-                    <a:bodyPr/>
-                    <a:lstStyle/>
-                    <a:p>
-                      <a:pPr marL="0" marR="0">
-                        <a:buNone/>
-                      </a:pPr>
-                      <a:r>
-                        <a:rPr lang="en-IN" sz="2000" kern="100">
-                          <a:effectLst/>
-                        </a:rPr>
-                        <a:t>38,242.36</a:t>
-                      </a:r>
-                      <a:endParaRPr lang="en-US" sz="2000" kern="100">
-                        <a:effectLst/>
-                        <a:latin typeface="Calibri" panose="020F0502020204030204" pitchFamily="34" charset="0"/>
-                        <a:ea typeface="Times New Roman" panose="02020603050405020304" pitchFamily="18" charset="0"/>
-                        <a:cs typeface="Arial" panose="020B0604020202020204" pitchFamily="34" charset="0"/>
-                      </a:endParaRPr>
-                    </a:p>
-                  </a:txBody>
-                  <a:tcPr marL="68580" marR="68580" marT="0" marB="0" anchor="ctr"/>
-                </a:tc>
-                <a:tc>
-                  <a:txBody>
-                    <a:bodyPr/>
-                    <a:lstStyle/>
-                    <a:p>
-                      <a:pPr marL="0" marR="0">
-                        <a:buNone/>
-                      </a:pPr>
-                      <a:r>
-                        <a:rPr lang="en-IN" sz="2000" kern="100">
-                          <a:effectLst/>
-                        </a:rPr>
-                        <a:t>5.6e+7</a:t>
-                      </a:r>
-                      <a:endParaRPr lang="en-US" sz="2000" kern="100">
-                        <a:effectLst/>
-                        <a:latin typeface="Calibri" panose="020F0502020204030204" pitchFamily="34" charset="0"/>
-                        <a:ea typeface="Times New Roman" panose="02020603050405020304" pitchFamily="18" charset="0"/>
-                        <a:cs typeface="Arial" panose="020B0604020202020204" pitchFamily="34" charset="0"/>
-                      </a:endParaRPr>
-                    </a:p>
-                  </a:txBody>
-                  <a:tcPr marL="68580" marR="68580" marT="0" marB="0" anchor="ctr"/>
-                </a:tc>
-                <a:tc>
-                  <a:txBody>
-                    <a:bodyPr/>
-                    <a:lstStyle/>
-                    <a:p>
-                      <a:pPr marL="0" marR="0">
-                        <a:buNone/>
-                      </a:pPr>
-                      <a:r>
-                        <a:rPr lang="en-IN" sz="2000" kern="100">
-                          <a:effectLst/>
-                        </a:rPr>
-                        <a:t>56,711.65</a:t>
-                      </a:r>
-                      <a:endParaRPr lang="en-US" sz="2000" kern="100">
-                        <a:effectLst/>
-                        <a:latin typeface="Calibri" panose="020F0502020204030204" pitchFamily="34" charset="0"/>
-                        <a:ea typeface="Times New Roman" panose="02020603050405020304" pitchFamily="18" charset="0"/>
-                        <a:cs typeface="Arial" panose="020B0604020202020204" pitchFamily="34" charset="0"/>
-                      </a:endParaRPr>
-                    </a:p>
-                  </a:txBody>
-                  <a:tcPr marL="68580" marR="68580" marT="0" marB="0" anchor="ctr"/>
-                </a:tc>
-                <a:tc>
-                  <a:txBody>
-                    <a:bodyPr/>
-                    <a:lstStyle/>
-                    <a:p>
-                      <a:pPr marL="0" marR="0">
-                        <a:buNone/>
-                      </a:pPr>
-                      <a:r>
-                        <a:rPr lang="en-IN" sz="2000" kern="100">
-                          <a:effectLst/>
-                        </a:rPr>
-                        <a:t>N/A</a:t>
-                      </a:r>
-                      <a:endParaRPr lang="en-US" sz="2000" kern="100">
-                        <a:effectLst/>
-                        <a:latin typeface="Calibri" panose="020F0502020204030204" pitchFamily="34" charset="0"/>
-                        <a:ea typeface="Times New Roman" panose="02020603050405020304" pitchFamily="18" charset="0"/>
-                        <a:cs typeface="Arial" panose="020B0604020202020204" pitchFamily="34" charset="0"/>
-                      </a:endParaRPr>
-                    </a:p>
-                  </a:txBody>
-                  <a:tcPr marL="68580" marR="68580" marT="0" marB="0" anchor="ctr"/>
-                </a:tc>
-                <a:tc>
-                  <a:txBody>
-                    <a:bodyPr/>
-                    <a:lstStyle/>
-                    <a:p>
-                      <a:pPr marL="0" marR="0">
-                        <a:buNone/>
-                      </a:pPr>
-                      <a:r>
-                        <a:rPr lang="en-IN" sz="2000" kern="100" dirty="0">
-                          <a:effectLst/>
-                        </a:rPr>
-                        <a:t>N/A</a:t>
-                      </a:r>
-                      <a:endParaRPr lang="en-US" sz="2000" kern="100" dirty="0">
-                        <a:effectLst/>
-                        <a:latin typeface="Calibri" panose="020F0502020204030204" pitchFamily="34" charset="0"/>
-                        <a:ea typeface="Times New Roman" panose="02020603050405020304" pitchFamily="18" charset="0"/>
-                        <a:cs typeface="Arial" panose="020B0604020202020204" pitchFamily="34" charset="0"/>
-                      </a:endParaRPr>
-                    </a:p>
-                  </a:txBody>
-                  <a:tcPr marL="68580" marR="68580" marT="0" marB="0" anchor="ctr"/>
-                </a:tc>
-                <a:extLst>
-                  <a:ext uri="{0D108BD9-81ED-4DB2-BD59-A6C34878D82A}">
-                    <a16:rowId xmlns:a16="http://schemas.microsoft.com/office/drawing/2014/main" val="2312051677"/>
-                  </a:ext>
-                </a:extLst>
-              </a:tr>
-            </a:tbl>
-          </a:graphicData>
-        </a:graphic>
-      </p:graphicFrame>
+            <a:pPr algn="ctr"/>
+            <a:r>
+              <a:rPr lang="en-US" sz="2800" b="1" kern="1200" dirty="0">
+                <a:solidFill>
+                  <a:srgbClr val="FFFFFF"/>
+                </a:solidFill>
+                <a:latin typeface="+mj-lt"/>
+                <a:ea typeface="+mj-ea"/>
+                <a:cs typeface="+mj-cs"/>
+              </a:rPr>
+              <a:t>Random Forest is the best model, slightly better than </a:t>
+            </a:r>
+            <a:r>
+              <a:rPr lang="en-US" sz="2800" b="1" kern="1200" dirty="0" err="1">
+                <a:solidFill>
+                  <a:srgbClr val="FFFFFF"/>
+                </a:solidFill>
+                <a:latin typeface="+mj-lt"/>
+                <a:ea typeface="+mj-ea"/>
+                <a:cs typeface="+mj-cs"/>
+              </a:rPr>
+              <a:t>exog</a:t>
+            </a:r>
+            <a:r>
+              <a:rPr lang="en-US" sz="2800" b="1" kern="1200" dirty="0">
+                <a:solidFill>
+                  <a:srgbClr val="FFFFFF"/>
+                </a:solidFill>
+                <a:latin typeface="+mj-lt"/>
+                <a:ea typeface="+mj-ea"/>
+                <a:cs typeface="+mj-cs"/>
+              </a:rPr>
+              <a:t> SARIMA</a:t>
+            </a:r>
+          </a:p>
+        </p:txBody>
+      </p:sp>
+      <p:pic>
+        <p:nvPicPr>
+          <p:cNvPr id="3074" name="Picture 2" descr="A graph of different colored bars&#10;&#10;AI-generated content may be incorrect.">
+            <a:extLst>
+              <a:ext uri="{FF2B5EF4-FFF2-40B4-BE49-F238E27FC236}">
+                <a16:creationId xmlns:a16="http://schemas.microsoft.com/office/drawing/2014/main" id="{B6278F15-A9AD-F0F1-020C-F9417EFA1D7F}"/>
+              </a:ext>
+            </a:extLst>
+          </p:cNvPr>
+          <p:cNvPicPr>
+            <a:picLocks noChangeAspect="1" noChangeArrowheads="1"/>
+          </p:cNvPicPr>
+          <p:nvPr/>
+        </p:nvPicPr>
+        <p:blipFill>
+          <a:blip r:embed="rId2">
+            <a:extLst>
+              <a:ext uri="{28A0092B-C50C-407E-A947-70E740481C1C}">
+                <a14:useLocalDpi xmlns:a14="http://schemas.microsoft.com/office/drawing/2010/main" val="0"/>
+              </a:ext>
+            </a:extLst>
+          </a:blip>
+          <a:stretch>
+            <a:fillRect/>
+          </a:stretch>
+        </p:blipFill>
+        <p:spPr bwMode="auto">
+          <a:xfrm>
+            <a:off x="4432299" y="101600"/>
+            <a:ext cx="7629071" cy="6545943"/>
+          </a:xfrm>
+          <a:prstGeom prst="rect">
+            <a:avLst/>
+          </a:prstGeom>
+          <a:noFill/>
+          <a:extLst>
+            <a:ext uri="{909E8E84-426E-40DD-AFC4-6F175D3DCCD1}">
+              <a14:hiddenFill xmlns:a14="http://schemas.microsoft.com/office/drawing/2010/main">
+                <a:solidFill>
+                  <a:srgbClr val="FFFFFF"/>
+                </a:solidFill>
+              </a14:hiddenFill>
+            </a:ext>
+          </a:extLst>
+        </p:spPr>
+      </p:pic>
     </p:spTree>
     <p:extLst>
       <p:ext uri="{BB962C8B-B14F-4D97-AF65-F5344CB8AC3E}">
@@ -5022,8 +3888,8 @@
         </p:nvSpPr>
         <p:spPr>
           <a:xfrm>
-            <a:off x="580571" y="1706088"/>
-            <a:ext cx="10914743" cy="4065280"/>
+            <a:off x="880051" y="1092312"/>
+            <a:ext cx="10744101" cy="3539430"/>
           </a:xfrm>
           <a:prstGeom prst="rect">
             <a:avLst/>
@@ -5036,121 +3902,95 @@
           </a:bodyPr>
           <a:lstStyle/>
           <a:p>
-            <a:pPr marL="457200" marR="0" indent="-457200">
-              <a:lnSpc>
-                <a:spcPct val="107000"/>
-              </a:lnSpc>
-              <a:spcAft>
-                <a:spcPts val="800"/>
-              </a:spcAft>
+            <a:pPr marL="457200" indent="-457200">
               <a:buFont typeface="Wingdings" pitchFamily="2" charset="2"/>
               <a:buChar char="Ø"/>
             </a:pPr>
             <a:r>
               <a:rPr lang="en-US" sz="3200" dirty="0">
-                <a:effectLst/>
                 <a:latin typeface="Calibri" panose="020F0502020204030204" pitchFamily="34" charset="0"/>
-                <a:ea typeface="Times New Roman" panose="02020603050405020304" pitchFamily="18" charset="0"/>
                 <a:cs typeface="Calibri" panose="020F0502020204030204" pitchFamily="34" charset="0"/>
               </a:rPr>
-              <a:t>SARIMA and EXOG SARIMA provide strong baseline forecasts. </a:t>
-            </a:r>
+              <a:t>Random Forest and </a:t>
+            </a:r>
+            <a:r>
+              <a:rPr lang="en-US" sz="3200" dirty="0" err="1">
+                <a:latin typeface="Calibri" panose="020F0502020204030204" pitchFamily="34" charset="0"/>
+                <a:cs typeface="Calibri" panose="020F0502020204030204" pitchFamily="34" charset="0"/>
+              </a:rPr>
+              <a:t>exogSARIMA</a:t>
+            </a:r>
+            <a:r>
+              <a:rPr lang="en-US" sz="3200" dirty="0">
+                <a:latin typeface="Calibri" panose="020F0502020204030204" pitchFamily="34" charset="0"/>
+                <a:cs typeface="Calibri" panose="020F0502020204030204" pitchFamily="34" charset="0"/>
+              </a:rPr>
+              <a:t> outperform other models</a:t>
+            </a:r>
+          </a:p>
+          <a:p>
             <a:endParaRPr lang="en-US" sz="3200" dirty="0">
-              <a:effectLst/>
               <a:latin typeface="Calibri" panose="020F0502020204030204" pitchFamily="34" charset="0"/>
-              <a:ea typeface="Calibri" panose="020F0502020204030204" pitchFamily="34" charset="0"/>
               <a:cs typeface="Calibri" panose="020F0502020204030204" pitchFamily="34" charset="0"/>
             </a:endParaRPr>
           </a:p>
           <a:p>
-            <a:pPr marL="457200" marR="0" indent="-457200">
-              <a:lnSpc>
-                <a:spcPct val="107000"/>
-              </a:lnSpc>
-              <a:spcAft>
-                <a:spcPts val="800"/>
-              </a:spcAft>
+            <a:pPr marL="457200" indent="-457200">
               <a:buFont typeface="Wingdings" pitchFamily="2" charset="2"/>
               <a:buChar char="Ø"/>
             </a:pPr>
             <a:r>
               <a:rPr lang="en-US" sz="3200" dirty="0">
-                <a:effectLst/>
                 <a:latin typeface="Calibri" panose="020F0502020204030204" pitchFamily="34" charset="0"/>
-                <a:ea typeface="Times New Roman" panose="02020603050405020304" pitchFamily="18" charset="0"/>
                 <a:cs typeface="Calibri" panose="020F0502020204030204" pitchFamily="34" charset="0"/>
               </a:rPr>
-              <a:t>Random Forest minimizes MAE better than ARIMA and SARIMA but shows higher RMSE. </a:t>
-            </a:r>
+              <a:t>LSTM performs poorly</a:t>
+            </a:r>
+          </a:p>
+          <a:p>
             <a:endParaRPr lang="en-US" sz="3200" dirty="0">
-              <a:effectLst/>
               <a:latin typeface="Calibri" panose="020F0502020204030204" pitchFamily="34" charset="0"/>
-              <a:ea typeface="Calibri" panose="020F0502020204030204" pitchFamily="34" charset="0"/>
               <a:cs typeface="Calibri" panose="020F0502020204030204" pitchFamily="34" charset="0"/>
             </a:endParaRPr>
           </a:p>
           <a:p>
-            <a:pPr marL="457200" marR="0" indent="-457200">
-              <a:lnSpc>
-                <a:spcPct val="107000"/>
-              </a:lnSpc>
-              <a:spcAft>
-                <a:spcPts val="800"/>
-              </a:spcAft>
+            <a:pPr marL="457200" indent="-457200">
               <a:buFont typeface="Wingdings" pitchFamily="2" charset="2"/>
               <a:buChar char="Ø"/>
             </a:pPr>
             <a:r>
               <a:rPr lang="en-US" sz="3200" dirty="0">
-                <a:effectLst/>
                 <a:latin typeface="Calibri" panose="020F0502020204030204" pitchFamily="34" charset="0"/>
-                <a:ea typeface="Times New Roman" panose="02020603050405020304" pitchFamily="18" charset="0"/>
                 <a:cs typeface="Calibri" panose="020F0502020204030204" pitchFamily="34" charset="0"/>
               </a:rPr>
-              <a:t>LSTM (Test) outperforms all other models, making it the top-performing model. </a:t>
-            </a:r>
+              <a:t>Traditional Time-Series Models Show Moderate Performance</a:t>
+            </a:r>
+          </a:p>
+          <a:p>
             <a:endParaRPr lang="en-US" sz="3200" dirty="0">
-              <a:effectLst/>
               <a:latin typeface="Calibri" panose="020F0502020204030204" pitchFamily="34" charset="0"/>
-              <a:ea typeface="Calibri" panose="020F0502020204030204" pitchFamily="34" charset="0"/>
               <a:cs typeface="Calibri" panose="020F0502020204030204" pitchFamily="34" charset="0"/>
             </a:endParaRPr>
           </a:p>
           <a:p>
-            <a:pPr marL="457200" marR="0" indent="-457200">
-              <a:lnSpc>
-                <a:spcPct val="107000"/>
-              </a:lnSpc>
-              <a:spcAft>
-                <a:spcPts val="800"/>
-              </a:spcAft>
+            <a:pPr marL="457200" indent="-457200">
               <a:buFont typeface="Wingdings" pitchFamily="2" charset="2"/>
               <a:buChar char="Ø"/>
             </a:pPr>
             <a:r>
               <a:rPr lang="en-US" sz="3200" dirty="0" err="1">
-                <a:effectLst/>
                 <a:latin typeface="Calibri" panose="020F0502020204030204" pitchFamily="34" charset="0"/>
-                <a:ea typeface="Times New Roman" panose="02020603050405020304" pitchFamily="18" charset="0"/>
                 <a:cs typeface="Calibri" panose="020F0502020204030204" pitchFamily="34" charset="0"/>
               </a:rPr>
               <a:t>XGBoost</a:t>
             </a:r>
             <a:r>
               <a:rPr lang="en-US" sz="3200" dirty="0">
-                <a:effectLst/>
                 <a:latin typeface="Calibri" panose="020F0502020204030204" pitchFamily="34" charset="0"/>
-                <a:ea typeface="Times New Roman" panose="02020603050405020304" pitchFamily="18" charset="0"/>
                 <a:cs typeface="Calibri" panose="020F0502020204030204" pitchFamily="34" charset="0"/>
               </a:rPr>
-              <a:t> shows weaker performance, likely needing tuning or different feature engineering.</a:t>
-            </a:r>
-            <a:endParaRPr lang="en-US" sz="3200" dirty="0">
-              <a:effectLst/>
-              <a:latin typeface="Calibri" panose="020F0502020204030204" pitchFamily="34" charset="0"/>
-              <a:ea typeface="Calibri" panose="020F0502020204030204" pitchFamily="34" charset="0"/>
-              <a:cs typeface="Calibri" panose="020F0502020204030204" pitchFamily="34" charset="0"/>
-            </a:endParaRPr>
+              <a:t> shows mixed results</a:t>
+            </a:r>
           </a:p>
         </p:txBody>
       </p:sp>
@@ -5158,6 +3998,221 @@
     <p:extLst>
       <p:ext uri="{BB962C8B-B14F-4D97-AF65-F5344CB8AC3E}">
         <p14:creationId xmlns:p14="http://schemas.microsoft.com/office/powerpoint/2010/main" val="590460534"/>
+      </p:ext>
+    </p:extLst>
+  </p:cSld>
+  <p:clrMapOvr>
+    <a:masterClrMapping/>
+  </p:clrMapOvr>
+</p:sld>
+</file>
+
+<file path=ppt/slides/slide13.xml><?xml version="1.0" encoding="utf-8"?>
+<p:sld xmlns:a="http://schemas.openxmlformats.org/drawingml/2006/main" xmlns:r="http://schemas.openxmlformats.org/officeDocument/2006/relationships" xmlns:p="http://schemas.openxmlformats.org/presentationml/2006/main">
+  <p:cSld>
+    <p:spTree>
+      <p:nvGrpSpPr>
+        <p:cNvPr id="1" name="">
+          <a:extLst>
+            <a:ext uri="{FF2B5EF4-FFF2-40B4-BE49-F238E27FC236}">
+              <a16:creationId xmlns:a16="http://schemas.microsoft.com/office/drawing/2014/main" id="{FD638C46-F4F0-AF93-EF7C-B99F064D900F}"/>
+            </a:ext>
+          </a:extLst>
+        </p:cNvPr>
+        <p:cNvGrpSpPr/>
+        <p:nvPr/>
+      </p:nvGrpSpPr>
+      <p:grpSpPr>
+        <a:xfrm>
+          <a:off x="0" y="0"/>
+          <a:ext cx="0" cy="0"/>
+          <a:chOff x="0" y="0"/>
+          <a:chExt cx="0" cy="0"/>
+        </a:xfrm>
+      </p:grpSpPr>
+      <p:sp>
+        <p:nvSpPr>
+          <p:cNvPr id="5" name="Title 4">
+            <a:extLst>
+              <a:ext uri="{FF2B5EF4-FFF2-40B4-BE49-F238E27FC236}">
+                <a16:creationId xmlns:a16="http://schemas.microsoft.com/office/drawing/2014/main" id="{6071EAAA-E85E-28E1-0CAC-AD0D3E5FE4D6}"/>
+              </a:ext>
+            </a:extLst>
+          </p:cNvPr>
+          <p:cNvSpPr>
+            <a:spLocks noGrp="1"/>
+          </p:cNvSpPr>
+          <p:nvPr>
+            <p:ph type="title"/>
+          </p:nvPr>
+        </p:nvSpPr>
+        <p:spPr>
+          <a:xfrm>
+            <a:off x="174321" y="102078"/>
+            <a:ext cx="10515600" cy="735689"/>
+          </a:xfrm>
+        </p:spPr>
+        <p:txBody>
+          <a:bodyPr/>
+          <a:lstStyle/>
+          <a:p>
+            <a:r>
+              <a:rPr lang="en-US" dirty="0">
+                <a:effectLst/>
+                <a:latin typeface="+mn-lt"/>
+              </a:rPr>
+              <a:t>Recommendations and Next Steps</a:t>
+            </a:r>
+            <a:endParaRPr lang="en-US" dirty="0">
+              <a:latin typeface="+mn-lt"/>
+            </a:endParaRPr>
+          </a:p>
+        </p:txBody>
+      </p:sp>
+      <p:sp>
+        <p:nvSpPr>
+          <p:cNvPr id="9" name="TextBox 8">
+            <a:extLst>
+              <a:ext uri="{FF2B5EF4-FFF2-40B4-BE49-F238E27FC236}">
+                <a16:creationId xmlns:a16="http://schemas.microsoft.com/office/drawing/2014/main" id="{772D98A7-B4DB-367C-E0CF-599CC62FD714}"/>
+              </a:ext>
+            </a:extLst>
+          </p:cNvPr>
+          <p:cNvSpPr txBox="1"/>
+          <p:nvPr/>
+        </p:nvSpPr>
+        <p:spPr>
+          <a:xfrm>
+            <a:off x="174321" y="837767"/>
+            <a:ext cx="12017679" cy="5262979"/>
+          </a:xfrm>
+          <a:prstGeom prst="rect">
+            <a:avLst/>
+          </a:prstGeom>
+          <a:noFill/>
+        </p:spPr>
+        <p:txBody>
+          <a:bodyPr wrap="square">
+            <a:spAutoFit/>
+          </a:bodyPr>
+          <a:lstStyle/>
+          <a:p>
+            <a:pPr marL="285750" indent="-285750">
+              <a:buFont typeface="Wingdings" pitchFamily="2" charset="2"/>
+              <a:buChar char="Ø"/>
+            </a:pPr>
+            <a:r>
+              <a:rPr lang="en-US" sz="2400" dirty="0">
+                <a:latin typeface="Calibri" panose="020F0502020204030204" pitchFamily="34" charset="0"/>
+                <a:cs typeface="Calibri" panose="020F0502020204030204" pitchFamily="34" charset="0"/>
+              </a:rPr>
+              <a:t>Improve </a:t>
+            </a:r>
+            <a:r>
+              <a:rPr lang="en-US" sz="2400" dirty="0" err="1">
+                <a:latin typeface="Calibri" panose="020F0502020204030204" pitchFamily="34" charset="0"/>
+                <a:cs typeface="Calibri" panose="020F0502020204030204" pitchFamily="34" charset="0"/>
+              </a:rPr>
+              <a:t>exogSARIMA</a:t>
+            </a:r>
+            <a:r>
+              <a:rPr lang="en-US" sz="2400" dirty="0">
+                <a:latin typeface="Calibri" panose="020F0502020204030204" pitchFamily="34" charset="0"/>
+                <a:cs typeface="Calibri" panose="020F0502020204030204" pitchFamily="34" charset="0"/>
+              </a:rPr>
+              <a:t> by incorporating additional external factors such as hospitalizations, variant-specific data, and real-time mobility patterns.</a:t>
+            </a:r>
+          </a:p>
+          <a:p>
+            <a:endParaRPr lang="en-US" sz="2400" dirty="0">
+              <a:latin typeface="Calibri" panose="020F0502020204030204" pitchFamily="34" charset="0"/>
+              <a:cs typeface="Calibri" panose="020F0502020204030204" pitchFamily="34" charset="0"/>
+            </a:endParaRPr>
+          </a:p>
+          <a:p>
+            <a:pPr marL="285750" indent="-285750">
+              <a:buFont typeface="Wingdings" pitchFamily="2" charset="2"/>
+              <a:buChar char="Ø"/>
+            </a:pPr>
+            <a:r>
+              <a:rPr lang="en-US" sz="2400" dirty="0">
+                <a:latin typeface="Calibri" panose="020F0502020204030204" pitchFamily="34" charset="0"/>
+                <a:cs typeface="Calibri" panose="020F0502020204030204" pitchFamily="34" charset="0"/>
+              </a:rPr>
+              <a:t>Combine machine learning and statistical models (e.g., Hybrid SARIMA-RF) for improved performance.</a:t>
+            </a:r>
+          </a:p>
+          <a:p>
+            <a:pPr marL="285750" indent="-285750">
+              <a:buFont typeface="Wingdings" pitchFamily="2" charset="2"/>
+              <a:buChar char="Ø"/>
+            </a:pPr>
+            <a:endParaRPr lang="en-US" sz="2400" dirty="0">
+              <a:latin typeface="Calibri" panose="020F0502020204030204" pitchFamily="34" charset="0"/>
+              <a:cs typeface="Calibri" panose="020F0502020204030204" pitchFamily="34" charset="0"/>
+            </a:endParaRPr>
+          </a:p>
+          <a:p>
+            <a:pPr marL="285750" indent="-285750">
+              <a:buFont typeface="Wingdings" pitchFamily="2" charset="2"/>
+              <a:buChar char="Ø"/>
+            </a:pPr>
+            <a:r>
+              <a:rPr lang="en-US" sz="2400" dirty="0">
+                <a:latin typeface="Calibri" panose="020F0502020204030204" pitchFamily="34" charset="0"/>
+                <a:cs typeface="Calibri" panose="020F0502020204030204" pitchFamily="34" charset="0"/>
+              </a:rPr>
+              <a:t>Improve LSTM by adjusting hyperparameters, increasing training data size, and using attention mechanisms.</a:t>
+            </a:r>
+          </a:p>
+          <a:p>
+            <a:pPr marL="285750" indent="-285750">
+              <a:buFont typeface="Wingdings" pitchFamily="2" charset="2"/>
+              <a:buChar char="Ø"/>
+            </a:pPr>
+            <a:endParaRPr lang="en-US" sz="2400" dirty="0">
+              <a:latin typeface="Calibri" panose="020F0502020204030204" pitchFamily="34" charset="0"/>
+              <a:cs typeface="Calibri" panose="020F0502020204030204" pitchFamily="34" charset="0"/>
+            </a:endParaRPr>
+          </a:p>
+          <a:p>
+            <a:pPr marL="285750" indent="-285750">
+              <a:buFont typeface="Wingdings" pitchFamily="2" charset="2"/>
+              <a:buChar char="Ø"/>
+            </a:pPr>
+            <a:r>
+              <a:rPr lang="en-US" sz="2400" dirty="0">
+                <a:latin typeface="Calibri" panose="020F0502020204030204" pitchFamily="34" charset="0"/>
+                <a:cs typeface="Calibri" panose="020F0502020204030204" pitchFamily="34" charset="0"/>
+              </a:rPr>
+              <a:t>Automate data collection pipelines for continuous model retraining to maintain forecasting accuracy.</a:t>
+            </a:r>
+          </a:p>
+          <a:p>
+            <a:endParaRPr lang="en-US" sz="2400" dirty="0">
+              <a:latin typeface="Calibri" panose="020F0502020204030204" pitchFamily="34" charset="0"/>
+              <a:cs typeface="Calibri" panose="020F0502020204030204" pitchFamily="34" charset="0"/>
+            </a:endParaRPr>
+          </a:p>
+          <a:p>
+            <a:pPr marL="285750" indent="-285750">
+              <a:buFont typeface="Wingdings" pitchFamily="2" charset="2"/>
+              <a:buChar char="Ø"/>
+            </a:pPr>
+            <a:r>
+              <a:rPr lang="en-US" sz="2400" dirty="0">
+                <a:latin typeface="Calibri" panose="020F0502020204030204" pitchFamily="34" charset="0"/>
+                <a:cs typeface="Calibri" panose="020F0502020204030204" pitchFamily="34" charset="0"/>
+              </a:rPr>
+              <a:t> Integrate these models with real-time dashboards to detect potential surges and mitigate outbreaks.</a:t>
+            </a:r>
+          </a:p>
+        </p:txBody>
+      </p:sp>
+    </p:spTree>
+    <p:extLst>
+      <p:ext uri="{BB962C8B-B14F-4D97-AF65-F5344CB8AC3E}">
+        <p14:creationId xmlns:p14="http://schemas.microsoft.com/office/powerpoint/2010/main" val="3907513878"/>
       </p:ext>
     </p:extLst>
   </p:cSld>
@@ -5172,7 +4227,13 @@
   <p:cSld>
     <p:spTree>
       <p:nvGrpSpPr>
-        <p:cNvPr id="1" name=""/>
+        <p:cNvPr id="1" name="">
+          <a:extLst>
+            <a:ext uri="{FF2B5EF4-FFF2-40B4-BE49-F238E27FC236}">
+              <a16:creationId xmlns:a16="http://schemas.microsoft.com/office/drawing/2014/main" id="{A0EB84EB-C111-45BD-CE03-827DF6CAAEFA}"/>
+            </a:ext>
+          </a:extLst>
+        </p:cNvPr>
         <p:cNvGrpSpPr/>
         <p:nvPr/>
       </p:nvGrpSpPr>
@@ -5186,10 +4247,10 @@
       </p:grpSpPr>
       <p:sp>
         <p:nvSpPr>
-          <p:cNvPr id="2" name="Title 1">
-            <a:extLst>
-              <a:ext uri="{FF2B5EF4-FFF2-40B4-BE49-F238E27FC236}">
-                <a16:creationId xmlns:a16="http://schemas.microsoft.com/office/drawing/2014/main" id="{C0001C93-DF14-48D5-F859-A48C4787908A}"/>
+          <p:cNvPr id="7" name="Title 6">
+            <a:extLst>
+              <a:ext uri="{FF2B5EF4-FFF2-40B4-BE49-F238E27FC236}">
+                <a16:creationId xmlns:a16="http://schemas.microsoft.com/office/drawing/2014/main" id="{8FACFC96-0B45-D3AC-DE18-9A54CC1C889B}"/>
               </a:ext>
             </a:extLst>
           </p:cNvPr>
@@ -5198,61 +4259,83 @@
           </p:cNvSpPr>
           <p:nvPr>
             <p:ph type="title"/>
-          </p:nvPr>
-        </p:nvSpPr>
-        <p:spPr/>
-        <p:txBody>
-          <a:bodyPr/>
-          <a:lstStyle/>
-          <a:p>
-            <a:r>
-              <a:rPr lang="en-US" dirty="0"/>
-              <a:t>Problem Statement:</a:t>
-            </a:r>
-            <a:br>
-              <a:rPr lang="en-US" dirty="0"/>
-            </a:br>
-            <a:endParaRPr lang="en-US" dirty="0"/>
-          </a:p>
-        </p:txBody>
-      </p:sp>
-      <p:sp>
-        <p:nvSpPr>
-          <p:cNvPr id="3" name="Content Placeholder 2">
-            <a:extLst>
-              <a:ext uri="{FF2B5EF4-FFF2-40B4-BE49-F238E27FC236}">
-                <a16:creationId xmlns:a16="http://schemas.microsoft.com/office/drawing/2014/main" id="{DF6D717B-219E-17D7-C290-BFBE73F7D642}"/>
-              </a:ext>
-            </a:extLst>
-          </p:cNvPr>
-          <p:cNvSpPr>
-            <a:spLocks noGrp="1"/>
-          </p:cNvSpPr>
-          <p:nvPr>
-            <p:ph idx="1"/>
           </p:nvPr>
         </p:nvSpPr>
         <p:spPr>
           <a:xfrm>
-            <a:off x="963460" y="1211850"/>
-            <a:ext cx="10515600" cy="4149290"/>
+            <a:off x="99164" y="0"/>
+            <a:ext cx="11725406" cy="926926"/>
           </a:xfrm>
         </p:spPr>
         <p:txBody>
           <a:bodyPr>
-            <a:normAutofit fontScale="25000" lnSpcReduction="20000"/>
+            <a:normAutofit fontScale="90000"/>
           </a:bodyPr>
           <a:lstStyle/>
           <a:p>
-            <a:pPr algn="just" fontAlgn="base">
-              <a:lnSpc>
-                <a:spcPct val="107000"/>
-              </a:lnSpc>
-              <a:buFont typeface="Wingdings" pitchFamily="2" charset="2"/>
-              <a:buChar char="Ø"/>
+            <a:r>
+              <a:rPr lang="en-US" b="1" dirty="0"/>
+              <a:t>Executive Summary – COVID-19 Case Forecasting</a:t>
+            </a:r>
+            <a:endParaRPr lang="en-US" dirty="0"/>
+          </a:p>
+        </p:txBody>
+      </p:sp>
+      <p:sp>
+        <p:nvSpPr>
+          <p:cNvPr id="9" name="TextBox 8">
+            <a:extLst>
+              <a:ext uri="{FF2B5EF4-FFF2-40B4-BE49-F238E27FC236}">
+                <a16:creationId xmlns:a16="http://schemas.microsoft.com/office/drawing/2014/main" id="{C535D72E-64DE-552E-4553-E6EB374D7FC3}"/>
+              </a:ext>
+            </a:extLst>
+          </p:cNvPr>
+          <p:cNvSpPr txBox="1"/>
+          <p:nvPr/>
+        </p:nvSpPr>
+        <p:spPr>
+          <a:xfrm>
+            <a:off x="99164" y="810668"/>
+            <a:ext cx="11725406" cy="5632311"/>
+          </a:xfrm>
+          <a:prstGeom prst="rect">
+            <a:avLst/>
+          </a:prstGeom>
+          <a:noFill/>
+        </p:spPr>
+        <p:txBody>
+          <a:bodyPr wrap="square">
+            <a:spAutoFit/>
+          </a:bodyPr>
+          <a:lstStyle/>
+          <a:p>
+            <a:pPr>
+              <a:buNone/>
             </a:pPr>
             <a:r>
-              <a:rPr lang="en-US" sz="9600" dirty="0">
+              <a:rPr lang="en-US" dirty="0"/>
+              <a:t>📌 </a:t>
+            </a:r>
+            <a:r>
+              <a:rPr lang="en-US" b="1" dirty="0"/>
+              <a:t>Objective:</a:t>
+            </a:r>
+            <a:r>
+              <a:rPr lang="en-US" dirty="0"/>
+              <a:t> </a:t>
+            </a:r>
+            <a:r>
+              <a:rPr lang="en-US" dirty="0">
+                <a:solidFill>
+                  <a:srgbClr val="333333"/>
+                </a:solidFill>
+                <a:latin typeface="Calibri" panose="020F0502020204030204" pitchFamily="34" charset="0"/>
+                <a:cs typeface="Calibri" panose="020F0502020204030204" pitchFamily="34" charset="0"/>
+              </a:rPr>
+              <a:t>E</a:t>
+            </a:r>
+            <a:r>
+              <a:rPr lang="en-US" sz="1800" dirty="0">
                 <a:solidFill>
                   <a:srgbClr val="333333"/>
                 </a:solidFill>
@@ -5261,112 +4344,260 @@
                 <a:ea typeface="Calibri" panose="020F0502020204030204" pitchFamily="34" charset="0"/>
                 <a:cs typeface="Calibri" panose="020F0502020204030204" pitchFamily="34" charset="0"/>
               </a:rPr>
-              <a:t>The COVID-19 pandemic has profoundly impacted public health and the economy, necessitating forecasting and risk prediction models to help decision-making. </a:t>
-            </a:r>
-          </a:p>
-          <a:p>
-            <a:pPr algn="just" fontAlgn="base">
-              <a:lnSpc>
-                <a:spcPct val="107000"/>
-              </a:lnSpc>
-              <a:buFont typeface="Wingdings" pitchFamily="2" charset="2"/>
-              <a:buChar char="Ø"/>
-            </a:pPr>
-            <a:r>
-              <a:rPr lang="en-US" sz="9600" dirty="0">
-                <a:solidFill>
-                  <a:srgbClr val="333333"/>
-                </a:solidFill>
-                <a:effectLst/>
-                <a:latin typeface="Calibri" panose="020F0502020204030204" pitchFamily="34" charset="0"/>
-                <a:ea typeface="Calibri" panose="020F0502020204030204" pitchFamily="34" charset="0"/>
-                <a:cs typeface="Calibri" panose="020F0502020204030204" pitchFamily="34" charset="0"/>
-              </a:rPr>
-              <a:t>In this application, I will explore a dataset from Kaggle. This dataset, provided by the World Health Organization (WHO), contains weekly reported COVID-19 cases and deaths worldwide. </a:t>
-            </a:r>
-            <a:endParaRPr lang="en-US" sz="9600" dirty="0">
-              <a:latin typeface="Calibri" panose="020F0502020204030204" pitchFamily="34" charset="0"/>
-              <a:ea typeface="Calibri" panose="020F0502020204030204" pitchFamily="34" charset="0"/>
-              <a:cs typeface="Calibri" panose="020F0502020204030204" pitchFamily="34" charset="0"/>
-            </a:endParaRPr>
-          </a:p>
-          <a:p>
-            <a:pPr algn="just" fontAlgn="base">
-              <a:lnSpc>
-                <a:spcPct val="107000"/>
-              </a:lnSpc>
-              <a:buFont typeface="Wingdings" pitchFamily="2" charset="2"/>
-              <a:buChar char="Ø"/>
-            </a:pPr>
-            <a:r>
-              <a:rPr lang="en-US" sz="9600" dirty="0">
-                <a:solidFill>
-                  <a:srgbClr val="333333"/>
-                </a:solidFill>
-                <a:effectLst/>
-                <a:latin typeface="Calibri" panose="020F0502020204030204" pitchFamily="34" charset="0"/>
-                <a:ea typeface="Calibri" panose="020F0502020204030204" pitchFamily="34" charset="0"/>
-                <a:cs typeface="Calibri" panose="020F0502020204030204" pitchFamily="34" charset="0"/>
-              </a:rPr>
-              <a:t>The primary goal of this project is to explore the COVID-19 trends around the globe and to develop a machine learning model to predict new cases in the United States. </a:t>
-            </a:r>
-            <a:endParaRPr lang="en-US" sz="9600" dirty="0">
-              <a:solidFill>
-                <a:srgbClr val="333333"/>
-              </a:solidFill>
-              <a:latin typeface="Calibri" panose="020F0502020204030204" pitchFamily="34" charset="0"/>
-              <a:ea typeface="Calibri" panose="020F0502020204030204" pitchFamily="34" charset="0"/>
-              <a:cs typeface="Calibri" panose="020F0502020204030204" pitchFamily="34" charset="0"/>
-            </a:endParaRPr>
-          </a:p>
-          <a:p>
-            <a:pPr algn="just" fontAlgn="base">
-              <a:lnSpc>
-                <a:spcPct val="107000"/>
-              </a:lnSpc>
-              <a:buFont typeface="Wingdings" pitchFamily="2" charset="2"/>
-              <a:buChar char="Ø"/>
-            </a:pPr>
-            <a:r>
-              <a:rPr lang="en-US" sz="9600" dirty="0">
-                <a:solidFill>
-                  <a:srgbClr val="333333"/>
-                </a:solidFill>
-                <a:effectLst/>
-                <a:latin typeface="Calibri" panose="020F0502020204030204" pitchFamily="34" charset="0"/>
-                <a:ea typeface="Calibri" panose="020F0502020204030204" pitchFamily="34" charset="0"/>
-                <a:cs typeface="Calibri" panose="020F0502020204030204" pitchFamily="34" charset="0"/>
-              </a:rPr>
-              <a:t> Time Series Forecasting: Predicting the number of new cases over the next few weeks in the USA.</a:t>
-            </a:r>
-            <a:endParaRPr lang="en-US" sz="9600" dirty="0">
-              <a:effectLst/>
-              <a:latin typeface="Calibri" panose="020F0502020204030204" pitchFamily="34" charset="0"/>
-              <a:ea typeface="Calibri" panose="020F0502020204030204" pitchFamily="34" charset="0"/>
-              <a:cs typeface="Calibri" panose="020F0502020204030204" pitchFamily="34" charset="0"/>
-            </a:endParaRPr>
-          </a:p>
-          <a:p>
-            <a:pPr marL="0" indent="0">
-              <a:buNone/>
-            </a:pPr>
-            <a:endParaRPr lang="en-US" sz="9600" dirty="0">
-              <a:latin typeface="Calibri" panose="020F0502020204030204" pitchFamily="34" charset="0"/>
-              <a:cs typeface="Calibri" panose="020F0502020204030204" pitchFamily="34" charset="0"/>
-            </a:endParaRPr>
-          </a:p>
-          <a:p>
-            <a:pPr marL="0" indent="0">
+              <a:t>xplore the COVID-19 trends around the globe and p</a:t>
+            </a:r>
+            <a:r>
+              <a:rPr lang="en-US" dirty="0"/>
+              <a:t>redict daily new COVID-19 cases in the U.S. using machine learning and time-series models.</a:t>
+            </a:r>
+          </a:p>
+          <a:p>
+            <a:pPr>
               <a:buNone/>
             </a:pPr>
             <a:endParaRPr lang="en-US" dirty="0"/>
+          </a:p>
+          <a:p>
+            <a:pPr>
+              <a:buNone/>
+            </a:pPr>
+            <a:r>
+              <a:rPr lang="en-US" dirty="0"/>
+              <a:t>📊 </a:t>
+            </a:r>
+            <a:r>
+              <a:rPr lang="en-US" b="1" dirty="0"/>
+              <a:t>Key Findings:</a:t>
+            </a:r>
+            <a:br>
+              <a:rPr lang="en-US" dirty="0"/>
+            </a:br>
+            <a:r>
+              <a:rPr lang="en-US" dirty="0"/>
+              <a:t>✅ </a:t>
+            </a:r>
+            <a:r>
+              <a:rPr lang="en-US" b="1" dirty="0"/>
+              <a:t>Best Models:</a:t>
+            </a:r>
+            <a:r>
+              <a:rPr lang="en-US" dirty="0"/>
+              <a:t> </a:t>
+            </a:r>
+            <a:r>
+              <a:rPr lang="en-US" b="1" dirty="0"/>
+              <a:t>Random Forest &amp; </a:t>
+            </a:r>
+            <a:r>
+              <a:rPr lang="en-US" b="1" dirty="0" err="1"/>
+              <a:t>exogSARIMA</a:t>
+            </a:r>
+            <a:r>
+              <a:rPr lang="en-US" dirty="0"/>
+              <a:t> – Lowest error, capturing complex trends &amp; external factors (e.g., mobility, vaccination).</a:t>
+            </a:r>
+          </a:p>
+          <a:p>
+            <a:pPr>
+              <a:buNone/>
+            </a:pPr>
+            <a:br>
+              <a:rPr lang="en-US" dirty="0"/>
+            </a:br>
+            <a:r>
+              <a:rPr lang="en-US" dirty="0"/>
+              <a:t>❌ </a:t>
+            </a:r>
+            <a:r>
+              <a:rPr lang="en-US" b="1" dirty="0"/>
+              <a:t>Worst Model:</a:t>
+            </a:r>
+            <a:r>
+              <a:rPr lang="en-US" dirty="0"/>
+              <a:t> </a:t>
+            </a:r>
+            <a:r>
+              <a:rPr lang="en-US" b="1" dirty="0"/>
+              <a:t>LSTM</a:t>
+            </a:r>
+            <a:r>
+              <a:rPr lang="en-US" dirty="0"/>
+              <a:t> – Poor performance due to high MAE, struggling with COVID-19 fluctuations.</a:t>
+            </a:r>
+          </a:p>
+          <a:p>
+            <a:pPr>
+              <a:buNone/>
+            </a:pPr>
+            <a:br>
+              <a:rPr lang="en-US" dirty="0"/>
+            </a:br>
+            <a:r>
+              <a:rPr lang="en-US" dirty="0"/>
+              <a:t>⚖️ </a:t>
+            </a:r>
+            <a:r>
+              <a:rPr lang="en-US" b="1" dirty="0"/>
+              <a:t>Moderate Performance:</a:t>
+            </a:r>
+            <a:r>
+              <a:rPr lang="en-US" dirty="0"/>
+              <a:t> </a:t>
+            </a:r>
+            <a:r>
+              <a:rPr lang="en-US" b="1" dirty="0"/>
+              <a:t>SARIMA &gt; ARIMA</a:t>
+            </a:r>
+            <a:r>
+              <a:rPr lang="en-US" dirty="0"/>
+              <a:t> – Handles seasonality but fails to adapt to sudden changes.</a:t>
+            </a:r>
+          </a:p>
+          <a:p>
+            <a:pPr>
+              <a:buNone/>
+            </a:pPr>
+            <a:r>
+              <a:rPr lang="en-US" dirty="0"/>
+              <a:t>⚡ </a:t>
+            </a:r>
+            <a:r>
+              <a:rPr lang="en-US" b="1" dirty="0" err="1"/>
+              <a:t>XGBoost</a:t>
+            </a:r>
+            <a:r>
+              <a:rPr lang="en-US" b="1" dirty="0"/>
+              <a:t>:</a:t>
+            </a:r>
+            <a:r>
+              <a:rPr lang="en-US" dirty="0"/>
+              <a:t> Better than ARIMA/SARIMA but weaker than Random Forest.</a:t>
+            </a:r>
+          </a:p>
+          <a:p>
+            <a:pPr>
+              <a:buNone/>
+            </a:pPr>
+            <a:endParaRPr lang="en-US" dirty="0"/>
+          </a:p>
+          <a:p>
+            <a:pPr>
+              <a:buNone/>
+            </a:pPr>
+            <a:r>
+              <a:rPr lang="en-US" dirty="0"/>
+              <a:t>🚀 </a:t>
+            </a:r>
+            <a:r>
+              <a:rPr lang="en-US" b="1" dirty="0"/>
+              <a:t>Next Steps &amp; Recommendations:</a:t>
+            </a:r>
+          </a:p>
+          <a:p>
+            <a:pPr>
+              <a:buNone/>
+            </a:pPr>
+            <a:br>
+              <a:rPr lang="en-US" dirty="0"/>
+            </a:br>
+            <a:r>
+              <a:rPr lang="en-US" dirty="0"/>
+              <a:t>🔹 </a:t>
+            </a:r>
+            <a:r>
+              <a:rPr lang="en-US" b="1" dirty="0"/>
+              <a:t>Enhance Feature Engineering</a:t>
+            </a:r>
+            <a:r>
+              <a:rPr lang="en-US" dirty="0"/>
+              <a:t> – Add real-time hospitalizations, variant-specific data.</a:t>
+            </a:r>
+            <a:br>
+              <a:rPr lang="en-US" dirty="0"/>
+            </a:br>
+            <a:r>
+              <a:rPr lang="en-US" dirty="0"/>
+              <a:t>🔹 </a:t>
+            </a:r>
+            <a:r>
+              <a:rPr lang="en-US" b="1" dirty="0"/>
+              <a:t>Hybrid Models</a:t>
+            </a:r>
+            <a:r>
+              <a:rPr lang="en-US" dirty="0"/>
+              <a:t> – Combine SARIMA with ML models for better accuracy.</a:t>
+            </a:r>
+            <a:br>
+              <a:rPr lang="en-US" dirty="0"/>
+            </a:br>
+            <a:r>
+              <a:rPr lang="en-US" dirty="0"/>
+              <a:t>🔹 </a:t>
+            </a:r>
+            <a:r>
+              <a:rPr lang="en-US" b="1" dirty="0"/>
+              <a:t>Automate Data Pipelines</a:t>
+            </a:r>
+            <a:r>
+              <a:rPr lang="en-US" dirty="0"/>
+              <a:t> – Enable real-time forecasting &amp; dashboard integration.</a:t>
+            </a:r>
+            <a:br>
+              <a:rPr lang="en-US" dirty="0"/>
+            </a:br>
+            <a:r>
+              <a:rPr lang="en-US" dirty="0"/>
+              <a:t>🔹 </a:t>
+            </a:r>
+            <a:r>
+              <a:rPr lang="en-US" b="1" dirty="0"/>
+              <a:t>Policy Impact</a:t>
+            </a:r>
+            <a:r>
+              <a:rPr lang="en-US" dirty="0"/>
+              <a:t> – Use </a:t>
+            </a:r>
+            <a:r>
+              <a:rPr lang="en-US" b="1" dirty="0"/>
+              <a:t>Random Forest &amp; </a:t>
+            </a:r>
+            <a:r>
+              <a:rPr lang="en-US" b="1" dirty="0" err="1"/>
+              <a:t>exogSARIMA</a:t>
+            </a:r>
+            <a:r>
+              <a:rPr lang="en-US" dirty="0"/>
+              <a:t> for public health decision-making.</a:t>
+            </a:r>
+          </a:p>
+          <a:p>
+            <a:r>
+              <a:rPr lang="en-US" dirty="0"/>
+              <a:t>📢 </a:t>
+            </a:r>
+            <a:r>
+              <a:rPr lang="en-US" b="1" dirty="0"/>
+              <a:t>Takeaway:</a:t>
+            </a:r>
+            <a:r>
+              <a:rPr lang="en-US" dirty="0"/>
+              <a:t> Random Forest &amp; </a:t>
+            </a:r>
+            <a:r>
+              <a:rPr lang="en-US" dirty="0" err="1"/>
+              <a:t>exogSARIMA</a:t>
+            </a:r>
+            <a:r>
+              <a:rPr lang="en-US" dirty="0"/>
+              <a:t> provide the most reliable COVID-19 forecasts, guiding policy &amp; healthcare interventions.</a:t>
+            </a:r>
           </a:p>
         </p:txBody>
       </p:sp>
     </p:spTree>
     <p:extLst>
       <p:ext uri="{BB962C8B-B14F-4D97-AF65-F5344CB8AC3E}">
-        <p14:creationId xmlns:p14="http://schemas.microsoft.com/office/powerpoint/2010/main" val="1441407348"/>
+        <p14:creationId xmlns:p14="http://schemas.microsoft.com/office/powerpoint/2010/main" val="1260004365"/>
       </p:ext>
     </p:extLst>
   </p:cSld>
@@ -5401,10 +4632,10 @@
       </p:grpSpPr>
       <p:sp>
         <p:nvSpPr>
-          <p:cNvPr id="2" name="Title 1">
-            <a:extLst>
-              <a:ext uri="{FF2B5EF4-FFF2-40B4-BE49-F238E27FC236}">
-                <a16:creationId xmlns:a16="http://schemas.microsoft.com/office/drawing/2014/main" id="{5F16E083-E44D-1005-79A6-4E3BA7DD060E}"/>
+          <p:cNvPr id="4" name="Title 3">
+            <a:extLst>
+              <a:ext uri="{FF2B5EF4-FFF2-40B4-BE49-F238E27FC236}">
+                <a16:creationId xmlns:a16="http://schemas.microsoft.com/office/drawing/2014/main" id="{E449BFA3-0168-9B51-30D1-70863400E93F}"/>
               </a:ext>
             </a:extLst>
           </p:cNvPr>
@@ -5415,28 +4646,32 @@
             <p:ph type="title"/>
           </p:nvPr>
         </p:nvSpPr>
-        <p:spPr/>
-        <p:txBody>
-          <a:bodyPr/>
-          <a:lstStyle/>
-          <a:p>
-            <a:r>
-              <a:rPr lang="en-US" dirty="0"/>
-              <a:t>Dataset:</a:t>
-            </a:r>
-            <a:br>
-              <a:rPr lang="en-US" dirty="0"/>
-            </a:br>
+        <p:spPr>
+          <a:xfrm>
+            <a:off x="262003" y="189413"/>
+            <a:ext cx="10515600" cy="599379"/>
+          </a:xfrm>
+        </p:spPr>
+        <p:txBody>
+          <a:bodyPr>
+            <a:normAutofit fontScale="90000"/>
+          </a:bodyPr>
+          <a:lstStyle/>
+          <a:p>
+            <a:r>
+              <a:rPr lang="en-US" b="1" dirty="0"/>
+              <a:t>WHO COVID-19 Global Dataset</a:t>
+            </a:r>
             <a:endParaRPr lang="en-US" dirty="0"/>
           </a:p>
         </p:txBody>
       </p:sp>
       <p:sp>
         <p:nvSpPr>
-          <p:cNvPr id="7" name="TextBox 6">
-            <a:extLst>
-              <a:ext uri="{FF2B5EF4-FFF2-40B4-BE49-F238E27FC236}">
-                <a16:creationId xmlns:a16="http://schemas.microsoft.com/office/drawing/2014/main" id="{659786D5-9CB5-EEB8-1B92-758745F86BDE}"/>
+          <p:cNvPr id="6" name="TextBox 5">
+            <a:extLst>
+              <a:ext uri="{FF2B5EF4-FFF2-40B4-BE49-F238E27FC236}">
+                <a16:creationId xmlns:a16="http://schemas.microsoft.com/office/drawing/2014/main" id="{022B3270-D346-2118-4137-A37B210F31B8}"/>
               </a:ext>
             </a:extLst>
           </p:cNvPr>
@@ -5445,8 +4680,8 @@
         </p:nvSpPr>
         <p:spPr>
           <a:xfrm>
-            <a:off x="1418572" y="1412815"/>
-            <a:ext cx="9541702" cy="4642105"/>
+            <a:off x="630477" y="1105918"/>
+            <a:ext cx="11356931" cy="5262979"/>
           </a:xfrm>
           <a:prstGeom prst="rect">
             <a:avLst/>
@@ -5459,215 +4694,148 @@
           </a:bodyPr>
           <a:lstStyle/>
           <a:p>
-            <a:pPr marL="457200" marR="0">
-              <a:lnSpc>
-                <a:spcPct val="107000"/>
-              </a:lnSpc>
-              <a:spcAft>
-                <a:spcPts val="800"/>
-              </a:spcAft>
+            <a:pPr>
+              <a:buNone/>
             </a:pPr>
             <a:r>
-              <a:rPr lang="en-US" sz="2400" dirty="0">
-                <a:effectLst/>
-                <a:latin typeface="Calibri" panose="020F0502020204030204" pitchFamily="34" charset="0"/>
-                <a:ea typeface="Times New Roman" panose="02020603050405020304" pitchFamily="18" charset="0"/>
-                <a:cs typeface="Calibri" panose="020F0502020204030204" pitchFamily="34" charset="0"/>
-              </a:rPr>
-              <a:t>This is WHO COVID-19 global dataset from Kaggle. This provides a comprehensive time-series view of reported cases and deaths globally, crucial for time series forecasting and identifying broader trends. </a:t>
-            </a:r>
-            <a:endParaRPr lang="en-US" sz="2400" dirty="0">
-              <a:latin typeface="Calibri" panose="020F0502020204030204" pitchFamily="34" charset="0"/>
-              <a:ea typeface="Times New Roman" panose="02020603050405020304" pitchFamily="18" charset="0"/>
-              <a:cs typeface="Calibri" panose="020F0502020204030204" pitchFamily="34" charset="0"/>
-            </a:endParaRPr>
-          </a:p>
-          <a:p>
-            <a:pPr marL="1257300" lvl="1" indent="-342900">
-              <a:lnSpc>
-                <a:spcPct val="107000"/>
-              </a:lnSpc>
-              <a:spcAft>
-                <a:spcPts val="800"/>
-              </a:spcAft>
-              <a:buFont typeface="Wingdings" pitchFamily="2" charset="2"/>
-              <a:buChar char="Ø"/>
+              <a:rPr lang="en-US" sz="2400" dirty="0"/>
+              <a:t>📌 </a:t>
+            </a:r>
+            <a:r>
+              <a:rPr lang="en-US" sz="2400" b="1" dirty="0"/>
+              <a:t>Overview:</a:t>
+            </a:r>
+            <a:endParaRPr lang="en-US" sz="2400" dirty="0"/>
+          </a:p>
+          <a:p>
+            <a:pPr>
+              <a:buFont typeface="Arial" panose="020B0604020202020204" pitchFamily="34" charset="0"/>
+              <a:buChar char="•"/>
             </a:pPr>
             <a:r>
-              <a:rPr lang="en-US" sz="2400" dirty="0">
-                <a:effectLst/>
-                <a:latin typeface="Calibri" panose="020F0502020204030204" pitchFamily="34" charset="0"/>
-                <a:ea typeface="Times New Roman" panose="02020603050405020304" pitchFamily="18" charset="0"/>
-                <a:cs typeface="Calibri" panose="020F0502020204030204" pitchFamily="34" charset="0"/>
-              </a:rPr>
-              <a:t>Dataset: WHO COVID-19 dataset</a:t>
-            </a:r>
-            <a:endParaRPr lang="en-US" sz="2400" dirty="0">
-              <a:effectLst/>
-              <a:latin typeface="Calibri" panose="020F0502020204030204" pitchFamily="34" charset="0"/>
-              <a:ea typeface="Calibri" panose="020F0502020204030204" pitchFamily="34" charset="0"/>
-              <a:cs typeface="Calibri" panose="020F0502020204030204" pitchFamily="34" charset="0"/>
-            </a:endParaRPr>
-          </a:p>
-          <a:p>
-            <a:pPr marL="1257300" lvl="2" indent="-342900">
-              <a:lnSpc>
-                <a:spcPct val="107000"/>
-              </a:lnSpc>
-              <a:spcAft>
-                <a:spcPts val="800"/>
-              </a:spcAft>
-              <a:buFont typeface="Wingdings" pitchFamily="2" charset="2"/>
-              <a:buChar char="Ø"/>
+              <a:rPr lang="en-US" sz="2400" dirty="0"/>
+              <a:t>Comprehensive time-series dataset covering global COVID-19 cases &amp; deaths.</a:t>
+            </a:r>
+          </a:p>
+          <a:p>
+            <a:pPr>
+              <a:buFont typeface="Arial" panose="020B0604020202020204" pitchFamily="34" charset="0"/>
+              <a:buChar char="•"/>
             </a:pPr>
             <a:r>
-              <a:rPr lang="en-US" sz="2400" dirty="0">
-                <a:effectLst/>
-                <a:latin typeface="Calibri" panose="020F0502020204030204" pitchFamily="34" charset="0"/>
-                <a:ea typeface="Times New Roman" panose="02020603050405020304" pitchFamily="18" charset="0"/>
-                <a:cs typeface="Calibri" panose="020F0502020204030204" pitchFamily="34" charset="0"/>
-              </a:rPr>
-              <a:t>Source: </a:t>
-            </a:r>
-            <a:r>
-              <a:rPr lang="en-US" sz="2400" u="sng" dirty="0">
-                <a:solidFill>
-                  <a:srgbClr val="0563C1"/>
-                </a:solidFill>
-                <a:effectLst/>
-                <a:latin typeface="Calibri" panose="020F0502020204030204" pitchFamily="34" charset="0"/>
-                <a:ea typeface="Times New Roman" panose="02020603050405020304" pitchFamily="18" charset="0"/>
-                <a:cs typeface="Calibri" panose="020F0502020204030204" pitchFamily="34" charset="0"/>
-                <a:hlinkClick r:id="rId2"/>
-              </a:rPr>
-              <a:t>Kaggle</a:t>
-            </a:r>
-            <a:r>
-              <a:rPr lang="en-US" sz="2400" dirty="0">
-                <a:effectLst/>
-                <a:latin typeface="Calibri" panose="020F0502020204030204" pitchFamily="34" charset="0"/>
-                <a:ea typeface="Times New Roman" panose="02020603050405020304" pitchFamily="18" charset="0"/>
-                <a:cs typeface="Calibri" panose="020F0502020204030204" pitchFamily="34" charset="0"/>
-              </a:rPr>
-              <a:t> </a:t>
-            </a:r>
-            <a:endParaRPr lang="en-US" sz="2400" dirty="0">
-              <a:effectLst/>
-              <a:latin typeface="Calibri" panose="020F0502020204030204" pitchFamily="34" charset="0"/>
-              <a:ea typeface="Calibri" panose="020F0502020204030204" pitchFamily="34" charset="0"/>
-              <a:cs typeface="Calibri" panose="020F0502020204030204" pitchFamily="34" charset="0"/>
-            </a:endParaRPr>
-          </a:p>
-          <a:p>
-            <a:pPr marL="1257300" lvl="2" indent="-342900">
-              <a:lnSpc>
-                <a:spcPct val="107000"/>
-              </a:lnSpc>
-              <a:spcAft>
-                <a:spcPts val="800"/>
-              </a:spcAft>
-              <a:buFont typeface="Wingdings" pitchFamily="2" charset="2"/>
-              <a:buChar char="Ø"/>
+              <a:rPr lang="en-US" sz="2400" dirty="0"/>
+              <a:t>Crucial for forecasting trends and informing public health decisions.</a:t>
+            </a:r>
+          </a:p>
+          <a:p>
+            <a:endParaRPr lang="en-US" sz="2400" dirty="0"/>
+          </a:p>
+          <a:p>
+            <a:pPr>
+              <a:buNone/>
             </a:pPr>
             <a:r>
-              <a:rPr lang="en-US" sz="2400" dirty="0">
-                <a:effectLst/>
-                <a:latin typeface="Calibri" panose="020F0502020204030204" pitchFamily="34" charset="0"/>
-                <a:ea typeface="Times New Roman" panose="02020603050405020304" pitchFamily="18" charset="0"/>
-                <a:cs typeface="Calibri" panose="020F0502020204030204" pitchFamily="34" charset="0"/>
-              </a:rPr>
-              <a:t>Time Period: Covers cases from early 2020 to 2023</a:t>
-            </a:r>
-            <a:endParaRPr lang="en-US" sz="2400" dirty="0">
-              <a:effectLst/>
-              <a:latin typeface="Calibri" panose="020F0502020204030204" pitchFamily="34" charset="0"/>
-              <a:ea typeface="Calibri" panose="020F0502020204030204" pitchFamily="34" charset="0"/>
-              <a:cs typeface="Calibri" panose="020F0502020204030204" pitchFamily="34" charset="0"/>
-            </a:endParaRPr>
-          </a:p>
-          <a:p>
-            <a:pPr marL="1257300" lvl="2" indent="-342900">
-              <a:lnSpc>
-                <a:spcPct val="107000"/>
-              </a:lnSpc>
-              <a:spcAft>
-                <a:spcPts val="800"/>
-              </a:spcAft>
-              <a:buFont typeface="Wingdings" pitchFamily="2" charset="2"/>
-              <a:buChar char="Ø"/>
+              <a:rPr lang="en-US" sz="2400" dirty="0"/>
+              <a:t>📊 </a:t>
+            </a:r>
+            <a:r>
+              <a:rPr lang="en-US" sz="2400" b="1" dirty="0"/>
+              <a:t>Dataset Details:</a:t>
+            </a:r>
+            <a:endParaRPr lang="en-US" sz="2400" dirty="0"/>
+          </a:p>
+          <a:p>
+            <a:pPr>
+              <a:buFont typeface="Arial" panose="020B0604020202020204" pitchFamily="34" charset="0"/>
+              <a:buChar char="•"/>
             </a:pPr>
             <a:r>
-              <a:rPr lang="en-US" sz="2400" dirty="0">
-                <a:effectLst/>
-                <a:latin typeface="Calibri" panose="020F0502020204030204" pitchFamily="34" charset="0"/>
-                <a:ea typeface="Times New Roman" panose="02020603050405020304" pitchFamily="18" charset="0"/>
-                <a:cs typeface="Calibri" panose="020F0502020204030204" pitchFamily="34" charset="0"/>
-              </a:rPr>
-              <a:t>Target Variable: New COVID-19 cases reported daily</a:t>
-            </a:r>
-            <a:endParaRPr lang="en-US" sz="2400" dirty="0">
-              <a:effectLst/>
-              <a:latin typeface="Calibri" panose="020F0502020204030204" pitchFamily="34" charset="0"/>
-              <a:ea typeface="Calibri" panose="020F0502020204030204" pitchFamily="34" charset="0"/>
-              <a:cs typeface="Calibri" panose="020F0502020204030204" pitchFamily="34" charset="0"/>
-            </a:endParaRPr>
-          </a:p>
-          <a:p>
-            <a:pPr marL="1257300" lvl="2" indent="-342900">
-              <a:lnSpc>
-                <a:spcPct val="107000"/>
-              </a:lnSpc>
-              <a:spcAft>
-                <a:spcPts val="800"/>
-              </a:spcAft>
-              <a:buFont typeface="Wingdings" pitchFamily="2" charset="2"/>
-              <a:buChar char="Ø"/>
+              <a:rPr lang="en-US" sz="2400" b="1" dirty="0"/>
+              <a:t>Source:</a:t>
+            </a:r>
+            <a:r>
+              <a:rPr lang="en-US" sz="2400" dirty="0"/>
+              <a:t> Kaggle</a:t>
+            </a:r>
+          </a:p>
+          <a:p>
+            <a:pPr>
+              <a:buFont typeface="Arial" panose="020B0604020202020204" pitchFamily="34" charset="0"/>
+              <a:buChar char="•"/>
             </a:pPr>
             <a:r>
-              <a:rPr lang="en-US" sz="2400" dirty="0">
-                <a:effectLst/>
-                <a:latin typeface="Calibri" panose="020F0502020204030204" pitchFamily="34" charset="0"/>
-                <a:ea typeface="Times New Roman" panose="02020603050405020304" pitchFamily="18" charset="0"/>
-                <a:cs typeface="Calibri" panose="020F0502020204030204" pitchFamily="34" charset="0"/>
-              </a:rPr>
-              <a:t>Data Size: </a:t>
-            </a:r>
-            <a:r>
-              <a:rPr lang="en-US" sz="2400" dirty="0">
-                <a:effectLst/>
-                <a:latin typeface="Calibri" panose="020F0502020204030204" pitchFamily="34" charset="0"/>
-                <a:ea typeface="Calibri" panose="020F0502020204030204" pitchFamily="34" charset="0"/>
-                <a:cs typeface="Calibri" panose="020F0502020204030204" pitchFamily="34" charset="0"/>
-              </a:rPr>
-              <a:t>It consists of 57,840 entries and 8 columns.</a:t>
-            </a:r>
-          </a:p>
-          <a:p>
-            <a:pPr marL="1257300" lvl="2" indent="-342900">
-              <a:lnSpc>
-                <a:spcPct val="107000"/>
-              </a:lnSpc>
-              <a:spcAft>
-                <a:spcPts val="800"/>
-              </a:spcAft>
-              <a:buFont typeface="Wingdings" pitchFamily="2" charset="2"/>
-              <a:buChar char="Ø"/>
+              <a:rPr lang="en-US" sz="2400" b="1" dirty="0"/>
+              <a:t>Period:</a:t>
+            </a:r>
+            <a:r>
+              <a:rPr lang="en-US" sz="2400" dirty="0"/>
+              <a:t> 2020 – 2023</a:t>
+            </a:r>
+          </a:p>
+          <a:p>
+            <a:pPr>
+              <a:buFont typeface="Arial" panose="020B0604020202020204" pitchFamily="34" charset="0"/>
+              <a:buChar char="•"/>
             </a:pPr>
             <a:r>
-              <a:rPr lang="en-US" sz="2400" dirty="0">
-                <a:effectLst/>
-                <a:latin typeface="Calibri" panose="020F0502020204030204" pitchFamily="34" charset="0"/>
-                <a:ea typeface="Times New Roman" panose="02020603050405020304" pitchFamily="18" charset="0"/>
-                <a:cs typeface="Calibri" panose="020F0502020204030204" pitchFamily="34" charset="0"/>
-              </a:rPr>
-              <a:t>Data Preprocessing: Handled missing values, ensured stationarity and applied log transformation for stabilization</a:t>
-            </a:r>
-            <a:endParaRPr lang="en-US" sz="2400" dirty="0">
-              <a:effectLst/>
-              <a:latin typeface="Calibri" panose="020F0502020204030204" pitchFamily="34" charset="0"/>
-              <a:ea typeface="Calibri" panose="020F0502020204030204" pitchFamily="34" charset="0"/>
-              <a:cs typeface="Calibri" panose="020F0502020204030204" pitchFamily="34" charset="0"/>
-            </a:endParaRPr>
+              <a:rPr lang="en-US" sz="2400" b="1" dirty="0"/>
+              <a:t>Size:</a:t>
+            </a:r>
+            <a:r>
+              <a:rPr lang="en-US" sz="2400" dirty="0"/>
+              <a:t> 57,840 entries, 8 columns</a:t>
+            </a:r>
+          </a:p>
+          <a:p>
+            <a:pPr>
+              <a:buFont typeface="Arial" panose="020B0604020202020204" pitchFamily="34" charset="0"/>
+              <a:buChar char="•"/>
+            </a:pPr>
+            <a:r>
+              <a:rPr lang="en-US" sz="2400" b="1" dirty="0"/>
+              <a:t>Target Variable:</a:t>
+            </a:r>
+            <a:r>
+              <a:rPr lang="en-US" sz="2400" dirty="0"/>
+              <a:t> Daily new COVID-19 cases</a:t>
+            </a:r>
+          </a:p>
+          <a:p>
+            <a:endParaRPr lang="en-US" sz="2400" dirty="0"/>
+          </a:p>
+          <a:p>
+            <a:pPr>
+              <a:buNone/>
+            </a:pPr>
+            <a:r>
+              <a:rPr lang="en-US" sz="2400" dirty="0"/>
+              <a:t>🛠 </a:t>
+            </a:r>
+            <a:r>
+              <a:rPr lang="en-US" sz="2400" b="1" dirty="0"/>
+              <a:t>Data Preprocessing:</a:t>
+            </a:r>
+            <a:br>
+              <a:rPr lang="en-US" sz="2400" dirty="0"/>
+            </a:br>
+            <a:r>
+              <a:rPr lang="en-US" sz="2400" dirty="0"/>
+              <a:t>✔ Checked data statistics &amp; handled missing values</a:t>
+            </a:r>
+            <a:br>
+              <a:rPr lang="en-US" sz="2400" dirty="0"/>
+            </a:br>
+            <a:r>
+              <a:rPr lang="en-US" sz="2400" dirty="0"/>
+              <a:t>✔ Removed duplicates &amp; ensured data integrity</a:t>
+            </a:r>
+            <a:br>
+              <a:rPr lang="en-US" sz="2400" dirty="0"/>
+            </a:br>
+            <a:r>
+              <a:rPr lang="en-US" sz="2400" dirty="0"/>
+              <a:t>✔ Prepped dataset for time-series modeling</a:t>
+            </a:r>
           </a:p>
         </p:txBody>
       </p:sp>
@@ -5717,7 +4885,12 @@
             <p:ph type="title"/>
           </p:nvPr>
         </p:nvSpPr>
-        <p:spPr/>
+        <p:spPr>
+          <a:xfrm>
+            <a:off x="161795" y="78809"/>
+            <a:ext cx="10515600" cy="737165"/>
+          </a:xfrm>
+        </p:spPr>
         <p:txBody>
           <a:bodyPr/>
           <a:lstStyle/>
@@ -5747,7 +4920,7 @@
         </p:nvSpPr>
         <p:spPr>
           <a:xfrm>
-            <a:off x="838200" y="1690688"/>
+            <a:off x="838200" y="1127016"/>
             <a:ext cx="10515600" cy="4351338"/>
           </a:xfrm>
         </p:spPr>
@@ -5866,10 +5039,10 @@
       </p:grpSpPr>
       <p:sp>
         <p:nvSpPr>
-          <p:cNvPr id="2" name="Title 1">
-            <a:extLst>
-              <a:ext uri="{FF2B5EF4-FFF2-40B4-BE49-F238E27FC236}">
-                <a16:creationId xmlns:a16="http://schemas.microsoft.com/office/drawing/2014/main" id="{CBE74BF1-27C5-BFF3-20B0-4D76F0AA637C}"/>
+          <p:cNvPr id="4" name="Title 3">
+            <a:extLst>
+              <a:ext uri="{FF2B5EF4-FFF2-40B4-BE49-F238E27FC236}">
+                <a16:creationId xmlns:a16="http://schemas.microsoft.com/office/drawing/2014/main" id="{E0D46537-B2A8-22F3-6F82-B18F946D7576}"/>
               </a:ext>
             </a:extLst>
           </p:cNvPr>
@@ -5882,8 +5055,8 @@
         </p:nvSpPr>
         <p:spPr>
           <a:xfrm>
-            <a:off x="615167" y="296236"/>
-            <a:ext cx="7677063" cy="607332"/>
+            <a:off x="165148" y="114301"/>
+            <a:ext cx="11861704" cy="457200"/>
           </a:xfrm>
         </p:spPr>
         <p:txBody>
@@ -5893,42 +5066,182 @@
           <a:lstStyle/>
           <a:p>
             <a:r>
-              <a:rPr lang="en-US" dirty="0"/>
-              <a:t>COVID-19 New Cases Global Trends </a:t>
+              <a:rPr lang="en-US" sz="3200" b="1" dirty="0"/>
+              <a:t>Percentage of COVID-19 cases and deaths across six WHO regions</a:t>
             </a:r>
           </a:p>
         </p:txBody>
       </p:sp>
       <p:pic>
         <p:nvPicPr>
-          <p:cNvPr id="7" name="Picture 6" descr="A map of the world&#10;&#10;AI-generated content may be incorrect.">
-            <a:extLst>
-              <a:ext uri="{FF2B5EF4-FFF2-40B4-BE49-F238E27FC236}">
-                <a16:creationId xmlns:a16="http://schemas.microsoft.com/office/drawing/2014/main" id="{D74A90C3-5C7C-71AD-A312-C32F5E94ED74}"/>
+          <p:cNvPr id="1028" name="Picture 4">
+            <a:extLst>
+              <a:ext uri="{FF2B5EF4-FFF2-40B4-BE49-F238E27FC236}">
+                <a16:creationId xmlns:a16="http://schemas.microsoft.com/office/drawing/2014/main" id="{777A5798-214C-0684-7AED-787454470244}"/>
               </a:ext>
             </a:extLst>
           </p:cNvPr>
           <p:cNvPicPr>
-            <a:picLocks noChangeAspect="1"/>
+            <a:picLocks noChangeAspect="1" noChangeArrowheads="1"/>
           </p:cNvPicPr>
           <p:nvPr/>
         </p:nvPicPr>
         <p:blipFill>
-          <a:blip r:embed="rId2"/>
+          <a:blip r:embed="rId2">
+            <a:extLst>
+              <a:ext uri="{28A0092B-C50C-407E-A947-70E740481C1C}">
+                <a14:useLocalDpi xmlns:a14="http://schemas.microsoft.com/office/drawing/2010/main" val="0"/>
+              </a:ext>
+            </a:extLst>
+          </a:blip>
+          <a:srcRect/>
           <a:stretch>
             <a:fillRect/>
           </a:stretch>
         </p:blipFill>
-        <p:spPr>
+        <p:spPr bwMode="auto">
           <a:xfrm>
-            <a:off x="856342" y="1223863"/>
-            <a:ext cx="9710057" cy="5337901"/>
+            <a:off x="70757" y="800100"/>
+            <a:ext cx="5595257" cy="5257800"/>
           </a:xfrm>
           <a:prstGeom prst="rect">
             <a:avLst/>
           </a:prstGeom>
+          <a:noFill/>
+          <a:extLst>
+            <a:ext uri="{909E8E84-426E-40DD-AFC4-6F175D3DCCD1}">
+              <a14:hiddenFill xmlns:a14="http://schemas.microsoft.com/office/drawing/2010/main">
+                <a:solidFill>
+                  <a:srgbClr val="FFFFFF"/>
+                </a:solidFill>
+              </a14:hiddenFill>
+            </a:ext>
+          </a:extLst>
         </p:spPr>
       </p:pic>
+      <p:pic>
+        <p:nvPicPr>
+          <p:cNvPr id="1030" name="Picture 6">
+            <a:extLst>
+              <a:ext uri="{FF2B5EF4-FFF2-40B4-BE49-F238E27FC236}">
+                <a16:creationId xmlns:a16="http://schemas.microsoft.com/office/drawing/2014/main" id="{3FACE9BF-3574-7B07-7C0F-BE37F8E4479F}"/>
+              </a:ext>
+            </a:extLst>
+          </p:cNvPr>
+          <p:cNvPicPr>
+            <a:picLocks noChangeAspect="1" noChangeArrowheads="1"/>
+          </p:cNvPicPr>
+          <p:nvPr/>
+        </p:nvPicPr>
+        <p:blipFill>
+          <a:blip r:embed="rId3">
+            <a:extLst>
+              <a:ext uri="{28A0092B-C50C-407E-A947-70E740481C1C}">
+                <a14:useLocalDpi xmlns:a14="http://schemas.microsoft.com/office/drawing/2010/main" val="0"/>
+              </a:ext>
+            </a:extLst>
+          </a:blip>
+          <a:srcRect/>
+          <a:stretch>
+            <a:fillRect/>
+          </a:stretch>
+        </p:blipFill>
+        <p:spPr bwMode="auto">
+          <a:xfrm>
+            <a:off x="5783895" y="800100"/>
+            <a:ext cx="6242957" cy="5257800"/>
+          </a:xfrm>
+          <a:prstGeom prst="rect">
+            <a:avLst/>
+          </a:prstGeom>
+          <a:noFill/>
+          <a:extLst>
+            <a:ext uri="{909E8E84-426E-40DD-AFC4-6F175D3DCCD1}">
+              <a14:hiddenFill xmlns:a14="http://schemas.microsoft.com/office/drawing/2010/main">
+                <a:solidFill>
+                  <a:srgbClr val="FFFFFF"/>
+                </a:solidFill>
+              </a14:hiddenFill>
+            </a:ext>
+          </a:extLst>
+        </p:spPr>
+      </p:pic>
+      <p:sp>
+        <p:nvSpPr>
+          <p:cNvPr id="6" name="TextBox 5">
+            <a:extLst>
+              <a:ext uri="{FF2B5EF4-FFF2-40B4-BE49-F238E27FC236}">
+                <a16:creationId xmlns:a16="http://schemas.microsoft.com/office/drawing/2014/main" id="{01C4768A-F474-28B2-3344-50FDF73B3E61}"/>
+              </a:ext>
+            </a:extLst>
+          </p:cNvPr>
+          <p:cNvSpPr txBox="1"/>
+          <p:nvPr/>
+        </p:nvSpPr>
+        <p:spPr>
+          <a:xfrm>
+            <a:off x="188638" y="6286499"/>
+            <a:ext cx="5595257" cy="461665"/>
+          </a:xfrm>
+          <a:prstGeom prst="rect">
+            <a:avLst/>
+          </a:prstGeom>
+          <a:noFill/>
+        </p:spPr>
+        <p:txBody>
+          <a:bodyPr wrap="square" rtlCol="0">
+            <a:spAutoFit/>
+          </a:bodyPr>
+          <a:lstStyle/>
+          <a:p>
+            <a:r>
+              <a:rPr lang="en-US" sz="2400" b="1" dirty="0">
+                <a:sym typeface="Wingdings" pitchFamily="2" charset="2"/>
+              </a:rPr>
+              <a:t>Hardest- hit region in cases  EURO</a:t>
+            </a:r>
+            <a:endParaRPr lang="en-US" sz="2400" b="1" dirty="0"/>
+          </a:p>
+        </p:txBody>
+      </p:sp>
+      <p:sp>
+        <p:nvSpPr>
+          <p:cNvPr id="8" name="TextBox 7">
+            <a:extLst>
+              <a:ext uri="{FF2B5EF4-FFF2-40B4-BE49-F238E27FC236}">
+                <a16:creationId xmlns:a16="http://schemas.microsoft.com/office/drawing/2014/main" id="{DE5C5453-F66D-4805-0E11-0A748334A2D0}"/>
+              </a:ext>
+            </a:extLst>
+          </p:cNvPr>
+          <p:cNvSpPr txBox="1"/>
+          <p:nvPr/>
+        </p:nvSpPr>
+        <p:spPr>
+          <a:xfrm>
+            <a:off x="6096000" y="6346176"/>
+            <a:ext cx="5930851" cy="461665"/>
+          </a:xfrm>
+          <a:prstGeom prst="rect">
+            <a:avLst/>
+          </a:prstGeom>
+          <a:noFill/>
+        </p:spPr>
+        <p:txBody>
+          <a:bodyPr wrap="square" rtlCol="0">
+            <a:spAutoFit/>
+          </a:bodyPr>
+          <a:lstStyle/>
+          <a:p>
+            <a:r>
+              <a:rPr lang="en-US" sz="2400" b="1" dirty="0">
+                <a:sym typeface="Wingdings" pitchFamily="2" charset="2"/>
+              </a:rPr>
+              <a:t>Deadliest-hit regions   AMRO and EURO</a:t>
+            </a:r>
+            <a:endParaRPr lang="en-US" sz="2400" b="1" dirty="0"/>
+          </a:p>
+        </p:txBody>
+      </p:sp>
     </p:spTree>
     <p:extLst>
       <p:ext uri="{BB962C8B-B14F-4D97-AF65-F5344CB8AC3E}">
@@ -5943,72 +5256,6 @@
 </file>
 
 <file path=ppt/slides/slide6.xml><?xml version="1.0" encoding="utf-8"?>
-<p:sld xmlns:a="http://schemas.openxmlformats.org/drawingml/2006/main" xmlns:r="http://schemas.openxmlformats.org/officeDocument/2006/relationships" xmlns:p="http://schemas.openxmlformats.org/presentationml/2006/main">
-  <p:cSld>
-    <p:spTree>
-      <p:nvGrpSpPr>
-        <p:cNvPr id="1" name="">
-          <a:extLst>
-            <a:ext uri="{FF2B5EF4-FFF2-40B4-BE49-F238E27FC236}">
-              <a16:creationId xmlns:a16="http://schemas.microsoft.com/office/drawing/2014/main" id="{B183D98E-E3CB-CB83-25AC-B00AD7BABA04}"/>
-            </a:ext>
-          </a:extLst>
-        </p:cNvPr>
-        <p:cNvGrpSpPr/>
-        <p:nvPr/>
-      </p:nvGrpSpPr>
-      <p:grpSpPr>
-        <a:xfrm>
-          <a:off x="0" y="0"/>
-          <a:ext cx="0" cy="0"/>
-          <a:chOff x="0" y="0"/>
-          <a:chExt cx="0" cy="0"/>
-        </a:xfrm>
-      </p:grpSpPr>
-      <p:pic>
-        <p:nvPicPr>
-          <p:cNvPr id="4" name="Picture 3" descr="A graph of different colored lines&#10;&#10;AI-generated content may be incorrect.">
-            <a:extLst>
-              <a:ext uri="{FF2B5EF4-FFF2-40B4-BE49-F238E27FC236}">
-                <a16:creationId xmlns:a16="http://schemas.microsoft.com/office/drawing/2014/main" id="{F875C1EA-26A2-27BD-BF9B-EDC0C7AE6FDE}"/>
-              </a:ext>
-            </a:extLst>
-          </p:cNvPr>
-          <p:cNvPicPr>
-            <a:picLocks noChangeAspect="1"/>
-          </p:cNvPicPr>
-          <p:nvPr/>
-        </p:nvPicPr>
-        <p:blipFill>
-          <a:blip r:embed="rId2"/>
-          <a:stretch>
-            <a:fillRect/>
-          </a:stretch>
-        </p:blipFill>
-        <p:spPr>
-          <a:xfrm>
-            <a:off x="615167" y="101600"/>
-            <a:ext cx="10961666" cy="6738586"/>
-          </a:xfrm>
-          <a:prstGeom prst="rect">
-            <a:avLst/>
-          </a:prstGeom>
-        </p:spPr>
-      </p:pic>
-    </p:spTree>
-    <p:extLst>
-      <p:ext uri="{BB962C8B-B14F-4D97-AF65-F5344CB8AC3E}">
-        <p14:creationId xmlns:p14="http://schemas.microsoft.com/office/powerpoint/2010/main" val="547388475"/>
-      </p:ext>
-    </p:extLst>
-  </p:cSld>
-  <p:clrMapOvr>
-    <a:masterClrMapping/>
-  </p:clrMapOvr>
-</p:sld>
-</file>
-
-<file path=ppt/slides/slide7.xml><?xml version="1.0" encoding="utf-8"?>
 <p:sld xmlns:a="http://schemas.openxmlformats.org/drawingml/2006/main" xmlns:r="http://schemas.openxmlformats.org/officeDocument/2006/relationships" xmlns:p="http://schemas.openxmlformats.org/presentationml/2006/main">
   <p:cSld>
     <p:spTree>
@@ -6033,32 +5280,49 @@
       </p:grpSpPr>
       <p:pic>
         <p:nvPicPr>
-          <p:cNvPr id="7" name="Picture 6" descr="A graph of different colored bars&#10;&#10;AI-generated content may be incorrect.">
-            <a:extLst>
-              <a:ext uri="{FF2B5EF4-FFF2-40B4-BE49-F238E27FC236}">
-                <a16:creationId xmlns:a16="http://schemas.microsoft.com/office/drawing/2014/main" id="{F7F0FFA2-0418-656B-D1C0-D5C23268823F}"/>
+          <p:cNvPr id="2050" name="Picture 2">
+            <a:extLst>
+              <a:ext uri="{FF2B5EF4-FFF2-40B4-BE49-F238E27FC236}">
+                <a16:creationId xmlns:a16="http://schemas.microsoft.com/office/drawing/2014/main" id="{6177799D-E65A-30D9-B8C9-77ECDC5CE2D2}"/>
               </a:ext>
             </a:extLst>
           </p:cNvPr>
           <p:cNvPicPr>
-            <a:picLocks noChangeAspect="1"/>
+            <a:picLocks noChangeAspect="1" noChangeArrowheads="1"/>
           </p:cNvPicPr>
           <p:nvPr/>
         </p:nvPicPr>
         <p:blipFill>
-          <a:blip r:embed="rId2"/>
+          <a:blip r:embed="rId2">
+            <a:extLst>
+              <a:ext uri="{28A0092B-C50C-407E-A947-70E740481C1C}">
+                <a14:useLocalDpi xmlns:a14="http://schemas.microsoft.com/office/drawing/2010/main" val="0"/>
+              </a:ext>
+            </a:extLst>
+          </a:blip>
+          <a:srcRect/>
           <a:stretch>
             <a:fillRect/>
           </a:stretch>
         </p:blipFill>
-        <p:spPr>
+        <p:spPr bwMode="auto">
           <a:xfrm>
-            <a:off x="129914" y="86193"/>
-            <a:ext cx="11932171" cy="6685613"/>
+            <a:off x="0" y="0"/>
+            <a:ext cx="12192000" cy="6858000"/>
           </a:xfrm>
           <a:prstGeom prst="rect">
             <a:avLst/>
           </a:prstGeom>
+          <a:noFill/>
+          <a:extLst>
+            <a:ext uri="{909E8E84-426E-40DD-AFC4-6F175D3DCCD1}">
+              <a14:hiddenFill xmlns:a14="http://schemas.microsoft.com/office/drawing/2010/main">
+                <a:solidFill>
+                  <a:srgbClr val="FFFFFF"/>
+                </a:solidFill>
+              </a14:hiddenFill>
+            </a:ext>
+          </a:extLst>
         </p:spPr>
       </p:pic>
     </p:spTree>
@@ -6074,7 +5338,7 @@
 </p:sld>
 </file>
 
-<file path=ppt/slides/slide8.xml><?xml version="1.0" encoding="utf-8"?>
+<file path=ppt/slides/slide7.xml><?xml version="1.0" encoding="utf-8"?>
 <p:sld xmlns:a="http://schemas.openxmlformats.org/drawingml/2006/main" xmlns:r="http://schemas.openxmlformats.org/officeDocument/2006/relationships" xmlns:p="http://schemas.openxmlformats.org/presentationml/2006/main">
   <p:cSld>
     <p:spTree>
@@ -6099,32 +5363,49 @@
       </p:grpSpPr>
       <p:pic>
         <p:nvPicPr>
-          <p:cNvPr id="4" name="Picture 3" descr="A graph of a number of people&#10;&#10;AI-generated content may be incorrect.">
-            <a:extLst>
-              <a:ext uri="{FF2B5EF4-FFF2-40B4-BE49-F238E27FC236}">
-                <a16:creationId xmlns:a16="http://schemas.microsoft.com/office/drawing/2014/main" id="{189F2B79-2EBD-1A15-33B9-61A281AD99BC}"/>
+          <p:cNvPr id="3074" name="Picture 2">
+            <a:extLst>
+              <a:ext uri="{FF2B5EF4-FFF2-40B4-BE49-F238E27FC236}">
+                <a16:creationId xmlns:a16="http://schemas.microsoft.com/office/drawing/2014/main" id="{FD33CC0C-A204-02F9-7D16-D9DDE004E5E0}"/>
               </a:ext>
             </a:extLst>
           </p:cNvPr>
           <p:cNvPicPr>
-            <a:picLocks noChangeAspect="1"/>
+            <a:picLocks noChangeAspect="1" noChangeArrowheads="1"/>
           </p:cNvPicPr>
           <p:nvPr/>
         </p:nvPicPr>
         <p:blipFill>
-          <a:blip r:embed="rId2"/>
+          <a:blip r:embed="rId2">
+            <a:extLst>
+              <a:ext uri="{28A0092B-C50C-407E-A947-70E740481C1C}">
+                <a14:useLocalDpi xmlns:a14="http://schemas.microsoft.com/office/drawing/2010/main" val="0"/>
+              </a:ext>
+            </a:extLst>
+          </a:blip>
+          <a:srcRect/>
           <a:stretch>
             <a:fillRect/>
           </a:stretch>
         </p:blipFill>
-        <p:spPr>
+        <p:spPr bwMode="auto">
           <a:xfrm>
-            <a:off x="239843" y="134910"/>
-            <a:ext cx="11662347" cy="6565693"/>
+            <a:off x="0" y="0"/>
+            <a:ext cx="12192000" cy="6858000"/>
           </a:xfrm>
           <a:prstGeom prst="rect">
             <a:avLst/>
           </a:prstGeom>
+          <a:noFill/>
+          <a:extLst>
+            <a:ext uri="{909E8E84-426E-40DD-AFC4-6F175D3DCCD1}">
+              <a14:hiddenFill xmlns:a14="http://schemas.microsoft.com/office/drawing/2010/main">
+                <a:solidFill>
+                  <a:srgbClr val="FFFFFF"/>
+                </a:solidFill>
+              </a14:hiddenFill>
+            </a:ext>
+          </a:extLst>
         </p:spPr>
       </p:pic>
     </p:spTree>
@@ -6140,7 +5421,7 @@
 </p:sld>
 </file>
 
-<file path=ppt/slides/slide9.xml><?xml version="1.0" encoding="utf-8"?>
+<file path=ppt/slides/slide8.xml><?xml version="1.0" encoding="utf-8"?>
 <p:sld xmlns:a="http://schemas.openxmlformats.org/drawingml/2006/main" xmlns:r="http://schemas.openxmlformats.org/officeDocument/2006/relationships" xmlns:p="http://schemas.openxmlformats.org/presentationml/2006/main">
   <p:cSld>
     <p:spTree>
@@ -6165,10 +5446,10 @@
       </p:grpSpPr>
       <p:pic>
         <p:nvPicPr>
-          <p:cNvPr id="1026" name="Picture 2">
-            <a:extLst>
-              <a:ext uri="{FF2B5EF4-FFF2-40B4-BE49-F238E27FC236}">
-                <a16:creationId xmlns:a16="http://schemas.microsoft.com/office/drawing/2014/main" id="{D46581AF-AB38-B3C6-1409-45B092070D0F}"/>
+          <p:cNvPr id="2" name="Picture 2">
+            <a:extLst>
+              <a:ext uri="{FF2B5EF4-FFF2-40B4-BE49-F238E27FC236}">
+                <a16:creationId xmlns:a16="http://schemas.microsoft.com/office/drawing/2014/main" id="{F7468526-5B60-F9B5-C35E-6723B945CD3F}"/>
               </a:ext>
             </a:extLst>
           </p:cNvPr>
@@ -6192,8 +5473,150 @@
         </p:blipFill>
         <p:spPr bwMode="auto">
           <a:xfrm>
-            <a:off x="-164892" y="0"/>
-            <a:ext cx="12356892" cy="6858000"/>
+            <a:off x="3111500" y="101600"/>
+            <a:ext cx="8902700" cy="6578600"/>
+          </a:xfrm>
+          <a:prstGeom prst="rect">
+            <a:avLst/>
+          </a:prstGeom>
+          <a:noFill/>
+          <a:extLst>
+            <a:ext uri="{909E8E84-426E-40DD-AFC4-6F175D3DCCD1}">
+              <a14:hiddenFill xmlns:a14="http://schemas.microsoft.com/office/drawing/2010/main">
+                <a:solidFill>
+                  <a:srgbClr val="FFFFFF"/>
+                </a:solidFill>
+              </a14:hiddenFill>
+            </a:ext>
+          </a:extLst>
+        </p:spPr>
+      </p:pic>
+      <p:sp>
+        <p:nvSpPr>
+          <p:cNvPr id="4" name="TextBox 3">
+            <a:extLst>
+              <a:ext uri="{FF2B5EF4-FFF2-40B4-BE49-F238E27FC236}">
+                <a16:creationId xmlns:a16="http://schemas.microsoft.com/office/drawing/2014/main" id="{4E834B48-18A8-FDF6-DA3B-FCCCA007966D}"/>
+              </a:ext>
+            </a:extLst>
+          </p:cNvPr>
+          <p:cNvSpPr txBox="1"/>
+          <p:nvPr/>
+        </p:nvSpPr>
+        <p:spPr>
+          <a:xfrm>
+            <a:off x="88900" y="347345"/>
+            <a:ext cx="2794000" cy="4801314"/>
+          </a:xfrm>
+          <a:prstGeom prst="rect">
+            <a:avLst/>
+          </a:prstGeom>
+          <a:noFill/>
+        </p:spPr>
+        <p:txBody>
+          <a:bodyPr wrap="square">
+            <a:spAutoFit/>
+          </a:bodyPr>
+          <a:lstStyle/>
+          <a:p>
+            <a:pPr marL="285750" indent="-285750">
+              <a:buFont typeface="Wingdings" pitchFamily="2" charset="2"/>
+              <a:buChar char="Ø"/>
+            </a:pPr>
+            <a:r>
+              <a:rPr lang="en-US" dirty="0"/>
+              <a:t>The two peaks in 2022 and 2023 suggest different waves of infection (e.g., the Omicron variant and its subvariants waves).</a:t>
+            </a:r>
+          </a:p>
+          <a:p>
+            <a:endParaRPr lang="en-US" dirty="0"/>
+          </a:p>
+          <a:p>
+            <a:pPr marL="285750" indent="-285750">
+              <a:buFont typeface="Wingdings" pitchFamily="2" charset="2"/>
+              <a:buChar char="Ø"/>
+            </a:pPr>
+            <a:endParaRPr lang="en-US" dirty="0"/>
+          </a:p>
+          <a:p>
+            <a:pPr marL="285750" indent="-285750">
+              <a:buFont typeface="Wingdings" pitchFamily="2" charset="2"/>
+              <a:buChar char="Ø"/>
+            </a:pPr>
+            <a:r>
+              <a:rPr lang="en-US" dirty="0"/>
+              <a:t>The other small peaks suggest the first outbreak started at the end of 2020, subsided slightly, and then again started increasing in mid-2021, declining slightly due to the interventions.</a:t>
+            </a:r>
+          </a:p>
+        </p:txBody>
+      </p:sp>
+    </p:spTree>
+    <p:extLst>
+      <p:ext uri="{BB962C8B-B14F-4D97-AF65-F5344CB8AC3E}">
+        <p14:creationId xmlns:p14="http://schemas.microsoft.com/office/powerpoint/2010/main" val="341799188"/>
+      </p:ext>
+    </p:extLst>
+  </p:cSld>
+  <p:clrMapOvr>
+    <a:masterClrMapping/>
+  </p:clrMapOvr>
+</p:sld>
+</file>
+
+<file path=ppt/slides/slide9.xml><?xml version="1.0" encoding="utf-8"?>
+<p:sld xmlns:a="http://schemas.openxmlformats.org/drawingml/2006/main" xmlns:r="http://schemas.openxmlformats.org/officeDocument/2006/relationships" xmlns:p="http://schemas.openxmlformats.org/presentationml/2006/main">
+  <p:cSld>
+    <p:spTree>
+      <p:nvGrpSpPr>
+        <p:cNvPr id="1" name="">
+          <a:extLst>
+            <a:ext uri="{FF2B5EF4-FFF2-40B4-BE49-F238E27FC236}">
+              <a16:creationId xmlns:a16="http://schemas.microsoft.com/office/drawing/2014/main" id="{F2159439-AE75-F047-3084-A7EAB41E3DD1}"/>
+            </a:ext>
+          </a:extLst>
+        </p:cNvPr>
+        <p:cNvGrpSpPr/>
+        <p:nvPr/>
+      </p:nvGrpSpPr>
+      <p:grpSpPr>
+        <a:xfrm>
+          <a:off x="0" y="0"/>
+          <a:ext cx="0" cy="0"/>
+          <a:chOff x="0" y="0"/>
+          <a:chExt cx="0" cy="0"/>
+        </a:xfrm>
+      </p:grpSpPr>
+      <p:pic>
+        <p:nvPicPr>
+          <p:cNvPr id="2050" name="Picture 2">
+            <a:extLst>
+              <a:ext uri="{FF2B5EF4-FFF2-40B4-BE49-F238E27FC236}">
+                <a16:creationId xmlns:a16="http://schemas.microsoft.com/office/drawing/2014/main" id="{B0990211-01FD-BCFC-3421-550EA47A924A}"/>
+              </a:ext>
+            </a:extLst>
+          </p:cNvPr>
+          <p:cNvPicPr>
+            <a:picLocks noChangeAspect="1" noChangeArrowheads="1"/>
+          </p:cNvPicPr>
+          <p:nvPr/>
+        </p:nvPicPr>
+        <p:blipFill>
+          <a:blip r:embed="rId2">
+            <a:extLst>
+              <a:ext uri="{28A0092B-C50C-407E-A947-70E740481C1C}">
+                <a14:useLocalDpi xmlns:a14="http://schemas.microsoft.com/office/drawing/2010/main" val="0"/>
+              </a:ext>
+            </a:extLst>
+          </a:blip>
+          <a:srcRect/>
+          <a:stretch>
+            <a:fillRect/>
+          </a:stretch>
+        </p:blipFill>
+        <p:spPr bwMode="auto">
+          <a:xfrm>
+            <a:off x="0" y="127000"/>
+            <a:ext cx="12192000" cy="6629399"/>
           </a:xfrm>
           <a:prstGeom prst="rect">
             <a:avLst/>
@@ -6213,7 +5636,7 @@
     </p:spTree>
     <p:extLst>
       <p:ext uri="{BB962C8B-B14F-4D97-AF65-F5344CB8AC3E}">
-        <p14:creationId xmlns:p14="http://schemas.microsoft.com/office/powerpoint/2010/main" val="341799188"/>
+        <p14:creationId xmlns:p14="http://schemas.microsoft.com/office/powerpoint/2010/main" val="554870010"/>
       </p:ext>
     </p:extLst>
   </p:cSld>

</xml_diff>